<commit_message>
Powerpoint Update 2 - 10/7/2019
</commit_message>
<xml_diff>
--- a/VincentFiles/Contact Manager.pptx
+++ b/VincentFiles/Contact Manager.pptx
@@ -8,10 +8,11 @@
     <p:sldId id="256" r:id="rId2"/>
     <p:sldId id="258" r:id="rId3"/>
     <p:sldId id="257" r:id="rId4"/>
-    <p:sldId id="259" r:id="rId5"/>
-    <p:sldId id="260" r:id="rId6"/>
-    <p:sldId id="261" r:id="rId7"/>
-    <p:sldId id="262" r:id="rId8"/>
+    <p:sldId id="263" r:id="rId5"/>
+    <p:sldId id="261" r:id="rId6"/>
+    <p:sldId id="260" r:id="rId7"/>
+    <p:sldId id="259" r:id="rId8"/>
+    <p:sldId id="262" r:id="rId9"/>
   </p:sldIdLst>
   <p:sldSz cx="12192000" cy="6858000"/>
   <p:notesSz cx="6858000" cy="9144000"/>
@@ -110,7 +111,2563 @@
       </a:defRPr>
     </a:lvl9pPr>
   </p:defaultTextStyle>
+  <p:extLst>
+    <p:ext uri="{EFAFB233-063F-42B5-8137-9DF3F51BA10A}">
+      <p15:sldGuideLst xmlns:p15="http://schemas.microsoft.com/office/powerpoint/2012/main"/>
+    </p:ext>
+  </p:extLst>
 </p:presentation>
+</file>
+
+<file path=ppt/diagrams/colors1.xml><?xml version="1.0" encoding="utf-8"?>
+<dgm:colorsDef xmlns:dgm="http://schemas.openxmlformats.org/drawingml/2006/diagram" xmlns:a="http://schemas.openxmlformats.org/drawingml/2006/main" uniqueId="urn:microsoft.com/office/officeart/2005/8/colors/colorful5">
+  <dgm:title val=""/>
+  <dgm:desc val=""/>
+  <dgm:catLst>
+    <dgm:cat type="colorful" pri="10500"/>
+  </dgm:catLst>
+  <dgm:styleLbl name="node0">
+    <dgm:fillClrLst meth="repeat">
+      <a:schemeClr val="accent4"/>
+    </dgm:fillClrLst>
+    <dgm:linClrLst meth="repeat">
+      <a:schemeClr val="lt1"/>
+    </dgm:linClrLst>
+    <dgm:effectClrLst/>
+    <dgm:txLinClrLst/>
+    <dgm:txFillClrLst/>
+    <dgm:txEffectClrLst/>
+  </dgm:styleLbl>
+  <dgm:styleLbl name="node1">
+    <dgm:fillClrLst>
+      <a:schemeClr val="accent5"/>
+      <a:schemeClr val="accent6"/>
+    </dgm:fillClrLst>
+    <dgm:linClrLst meth="repeat">
+      <a:schemeClr val="lt1"/>
+    </dgm:linClrLst>
+    <dgm:effectClrLst/>
+    <dgm:txLinClrLst/>
+    <dgm:txFillClrLst/>
+    <dgm:txEffectClrLst/>
+  </dgm:styleLbl>
+  <dgm:styleLbl name="alignNode1">
+    <dgm:fillClrLst>
+      <a:schemeClr val="accent5"/>
+      <a:schemeClr val="accent6"/>
+    </dgm:fillClrLst>
+    <dgm:linClrLst>
+      <a:schemeClr val="accent5"/>
+      <a:schemeClr val="accent6"/>
+    </dgm:linClrLst>
+    <dgm:effectClrLst/>
+    <dgm:txLinClrLst/>
+    <dgm:txFillClrLst/>
+    <dgm:txEffectClrLst/>
+  </dgm:styleLbl>
+  <dgm:styleLbl name="lnNode1">
+    <dgm:fillClrLst>
+      <a:schemeClr val="accent5"/>
+      <a:schemeClr val="accent6"/>
+    </dgm:fillClrLst>
+    <dgm:linClrLst meth="repeat">
+      <a:schemeClr val="lt1"/>
+    </dgm:linClrLst>
+    <dgm:effectClrLst/>
+    <dgm:txLinClrLst/>
+    <dgm:txFillClrLst/>
+    <dgm:txEffectClrLst/>
+  </dgm:styleLbl>
+  <dgm:styleLbl name="vennNode1">
+    <dgm:fillClrLst>
+      <a:schemeClr val="accent5">
+        <a:alpha val="50000"/>
+      </a:schemeClr>
+      <a:schemeClr val="accent6">
+        <a:alpha val="50000"/>
+      </a:schemeClr>
+    </dgm:fillClrLst>
+    <dgm:linClrLst meth="repeat">
+      <a:schemeClr val="lt1"/>
+    </dgm:linClrLst>
+    <dgm:effectClrLst/>
+    <dgm:txLinClrLst/>
+    <dgm:txFillClrLst/>
+    <dgm:txEffectClrLst/>
+  </dgm:styleLbl>
+  <dgm:styleLbl name="node2">
+    <dgm:fillClrLst>
+      <a:schemeClr val="accent6"/>
+    </dgm:fillClrLst>
+    <dgm:linClrLst meth="repeat">
+      <a:schemeClr val="lt1"/>
+    </dgm:linClrLst>
+    <dgm:effectClrLst/>
+    <dgm:txLinClrLst/>
+    <dgm:txFillClrLst/>
+    <dgm:txEffectClrLst/>
+  </dgm:styleLbl>
+  <dgm:styleLbl name="node3">
+    <dgm:fillClrLst>
+      <a:schemeClr val="accent1"/>
+    </dgm:fillClrLst>
+    <dgm:linClrLst meth="repeat">
+      <a:schemeClr val="lt1"/>
+    </dgm:linClrLst>
+    <dgm:effectClrLst/>
+    <dgm:txLinClrLst/>
+    <dgm:txFillClrLst/>
+    <dgm:txEffectClrLst/>
+  </dgm:styleLbl>
+  <dgm:styleLbl name="node4">
+    <dgm:fillClrLst>
+      <a:schemeClr val="accent2"/>
+    </dgm:fillClrLst>
+    <dgm:linClrLst meth="repeat">
+      <a:schemeClr val="lt1"/>
+    </dgm:linClrLst>
+    <dgm:effectClrLst/>
+    <dgm:txLinClrLst/>
+    <dgm:txFillClrLst/>
+    <dgm:txEffectClrLst/>
+  </dgm:styleLbl>
+  <dgm:styleLbl name="fgImgPlace1">
+    <dgm:fillClrLst>
+      <a:schemeClr val="accent5">
+        <a:tint val="50000"/>
+      </a:schemeClr>
+      <a:schemeClr val="accent6">
+        <a:tint val="50000"/>
+      </a:schemeClr>
+    </dgm:fillClrLst>
+    <dgm:linClrLst meth="repeat">
+      <a:schemeClr val="lt1"/>
+    </dgm:linClrLst>
+    <dgm:effectClrLst/>
+    <dgm:txLinClrLst/>
+    <dgm:txFillClrLst meth="repeat">
+      <a:schemeClr val="lt1"/>
+    </dgm:txFillClrLst>
+    <dgm:txEffectClrLst/>
+  </dgm:styleLbl>
+  <dgm:styleLbl name="alignImgPlace1">
+    <dgm:fillClrLst>
+      <a:schemeClr val="accent5">
+        <a:tint val="50000"/>
+      </a:schemeClr>
+      <a:schemeClr val="accent6">
+        <a:tint val="20000"/>
+      </a:schemeClr>
+    </dgm:fillClrLst>
+    <dgm:linClrLst meth="repeat">
+      <a:schemeClr val="lt1"/>
+    </dgm:linClrLst>
+    <dgm:effectClrLst/>
+    <dgm:txLinClrLst/>
+    <dgm:txFillClrLst meth="repeat">
+      <a:schemeClr val="lt1"/>
+    </dgm:txFillClrLst>
+    <dgm:txEffectClrLst/>
+  </dgm:styleLbl>
+  <dgm:styleLbl name="bgImgPlace1">
+    <dgm:fillClrLst>
+      <a:schemeClr val="accent5">
+        <a:tint val="50000"/>
+      </a:schemeClr>
+      <a:schemeClr val="accent6">
+        <a:tint val="20000"/>
+      </a:schemeClr>
+    </dgm:fillClrLst>
+    <dgm:linClrLst meth="repeat">
+      <a:schemeClr val="lt1"/>
+    </dgm:linClrLst>
+    <dgm:effectClrLst/>
+    <dgm:txLinClrLst/>
+    <dgm:txFillClrLst meth="repeat">
+      <a:schemeClr val="lt1"/>
+    </dgm:txFillClrLst>
+    <dgm:txEffectClrLst/>
+  </dgm:styleLbl>
+  <dgm:styleLbl name="sibTrans2D1">
+    <dgm:fillClrLst>
+      <a:schemeClr val="accent5"/>
+      <a:schemeClr val="accent6"/>
+    </dgm:fillClrLst>
+    <dgm:linClrLst meth="repeat">
+      <a:schemeClr val="lt1"/>
+    </dgm:linClrLst>
+    <dgm:effectClrLst/>
+    <dgm:txLinClrLst/>
+    <dgm:txFillClrLst/>
+    <dgm:txEffectClrLst/>
+  </dgm:styleLbl>
+  <dgm:styleLbl name="fgSibTrans2D1">
+    <dgm:fillClrLst>
+      <a:schemeClr val="accent5"/>
+      <a:schemeClr val="accent6"/>
+    </dgm:fillClrLst>
+    <dgm:linClrLst meth="repeat">
+      <a:schemeClr val="lt1"/>
+    </dgm:linClrLst>
+    <dgm:effectClrLst/>
+    <dgm:txLinClrLst/>
+    <dgm:txFillClrLst meth="repeat">
+      <a:schemeClr val="lt1"/>
+    </dgm:txFillClrLst>
+    <dgm:txEffectClrLst/>
+  </dgm:styleLbl>
+  <dgm:styleLbl name="bgSibTrans2D1">
+    <dgm:fillClrLst>
+      <a:schemeClr val="accent5"/>
+      <a:schemeClr val="accent6"/>
+    </dgm:fillClrLst>
+    <dgm:linClrLst meth="repeat">
+      <a:schemeClr val="lt1"/>
+    </dgm:linClrLst>
+    <dgm:effectClrLst/>
+    <dgm:txLinClrLst/>
+    <dgm:txFillClrLst meth="repeat">
+      <a:schemeClr val="lt1"/>
+    </dgm:txFillClrLst>
+    <dgm:txEffectClrLst/>
+  </dgm:styleLbl>
+  <dgm:styleLbl name="sibTrans1D1">
+    <dgm:fillClrLst/>
+    <dgm:linClrLst>
+      <a:schemeClr val="accent5"/>
+      <a:schemeClr val="accent6"/>
+    </dgm:linClrLst>
+    <dgm:effectClrLst/>
+    <dgm:txLinClrLst/>
+    <dgm:txFillClrLst meth="repeat">
+      <a:schemeClr val="tx1"/>
+    </dgm:txFillClrLst>
+    <dgm:txEffectClrLst/>
+  </dgm:styleLbl>
+  <dgm:styleLbl name="callout">
+    <dgm:fillClrLst meth="repeat">
+      <a:schemeClr val="accent5"/>
+    </dgm:fillClrLst>
+    <dgm:linClrLst meth="repeat">
+      <a:schemeClr val="accent5">
+        <a:tint val="50000"/>
+      </a:schemeClr>
+    </dgm:linClrLst>
+    <dgm:effectClrLst/>
+    <dgm:txLinClrLst/>
+    <dgm:txFillClrLst meth="repeat">
+      <a:schemeClr val="tx1"/>
+    </dgm:txFillClrLst>
+    <dgm:txEffectClrLst/>
+  </dgm:styleLbl>
+  <dgm:styleLbl name="asst0">
+    <dgm:fillClrLst meth="repeat">
+      <a:schemeClr val="accent5"/>
+    </dgm:fillClrLst>
+    <dgm:linClrLst meth="repeat">
+      <a:schemeClr val="lt1">
+        <a:shade val="80000"/>
+      </a:schemeClr>
+    </dgm:linClrLst>
+    <dgm:effectClrLst/>
+    <dgm:txLinClrLst/>
+    <dgm:txFillClrLst/>
+    <dgm:txEffectClrLst/>
+  </dgm:styleLbl>
+  <dgm:styleLbl name="asst1">
+    <dgm:fillClrLst meth="repeat">
+      <a:schemeClr val="accent6"/>
+    </dgm:fillClrLst>
+    <dgm:linClrLst meth="repeat">
+      <a:schemeClr val="lt1">
+        <a:shade val="80000"/>
+      </a:schemeClr>
+    </dgm:linClrLst>
+    <dgm:effectClrLst/>
+    <dgm:txLinClrLst/>
+    <dgm:txFillClrLst/>
+    <dgm:txEffectClrLst/>
+  </dgm:styleLbl>
+  <dgm:styleLbl name="asst2">
+    <dgm:fillClrLst>
+      <a:schemeClr val="accent1"/>
+    </dgm:fillClrLst>
+    <dgm:linClrLst meth="repeat">
+      <a:schemeClr val="lt1"/>
+    </dgm:linClrLst>
+    <dgm:effectClrLst/>
+    <dgm:txLinClrLst/>
+    <dgm:txFillClrLst/>
+    <dgm:txEffectClrLst/>
+  </dgm:styleLbl>
+  <dgm:styleLbl name="asst3">
+    <dgm:fillClrLst>
+      <a:schemeClr val="accent2"/>
+    </dgm:fillClrLst>
+    <dgm:linClrLst meth="repeat">
+      <a:schemeClr val="lt1"/>
+    </dgm:linClrLst>
+    <dgm:effectClrLst/>
+    <dgm:txLinClrLst/>
+    <dgm:txFillClrLst/>
+    <dgm:txEffectClrLst/>
+  </dgm:styleLbl>
+  <dgm:styleLbl name="asst4">
+    <dgm:fillClrLst>
+      <a:schemeClr val="accent3"/>
+    </dgm:fillClrLst>
+    <dgm:linClrLst meth="repeat">
+      <a:schemeClr val="lt1"/>
+    </dgm:linClrLst>
+    <dgm:effectClrLst/>
+    <dgm:txLinClrLst/>
+    <dgm:txFillClrLst/>
+    <dgm:txEffectClrLst/>
+  </dgm:styleLbl>
+  <dgm:styleLbl name="parChTrans2D1">
+    <dgm:fillClrLst meth="repeat">
+      <a:schemeClr val="accent5"/>
+    </dgm:fillClrLst>
+    <dgm:linClrLst meth="repeat">
+      <a:schemeClr val="lt1"/>
+    </dgm:linClrLst>
+    <dgm:effectClrLst/>
+    <dgm:txLinClrLst/>
+    <dgm:txFillClrLst meth="repeat">
+      <a:schemeClr val="lt1"/>
+    </dgm:txFillClrLst>
+    <dgm:txEffectClrLst/>
+  </dgm:styleLbl>
+  <dgm:styleLbl name="parChTrans2D2">
+    <dgm:fillClrLst meth="repeat">
+      <a:schemeClr val="accent6"/>
+    </dgm:fillClrLst>
+    <dgm:linClrLst meth="repeat">
+      <a:schemeClr val="lt1"/>
+    </dgm:linClrLst>
+    <dgm:effectClrLst/>
+    <dgm:txLinClrLst/>
+    <dgm:txFillClrLst/>
+    <dgm:txEffectClrLst/>
+  </dgm:styleLbl>
+  <dgm:styleLbl name="parChTrans2D3">
+    <dgm:fillClrLst meth="repeat">
+      <a:schemeClr val="accent6"/>
+    </dgm:fillClrLst>
+    <dgm:linClrLst meth="repeat">
+      <a:schemeClr val="lt1"/>
+    </dgm:linClrLst>
+    <dgm:effectClrLst/>
+    <dgm:txLinClrLst/>
+    <dgm:txFillClrLst/>
+    <dgm:txEffectClrLst/>
+  </dgm:styleLbl>
+  <dgm:styleLbl name="parChTrans2D4">
+    <dgm:fillClrLst meth="repeat">
+      <a:schemeClr val="accent1"/>
+    </dgm:fillClrLst>
+    <dgm:linClrLst meth="repeat">
+      <a:schemeClr val="lt1"/>
+    </dgm:linClrLst>
+    <dgm:effectClrLst/>
+    <dgm:txLinClrLst/>
+    <dgm:txFillClrLst meth="repeat">
+      <a:schemeClr val="lt1"/>
+    </dgm:txFillClrLst>
+    <dgm:txEffectClrLst/>
+  </dgm:styleLbl>
+  <dgm:styleLbl name="parChTrans1D1">
+    <dgm:fillClrLst meth="repeat">
+      <a:schemeClr val="accent5"/>
+    </dgm:fillClrLst>
+    <dgm:linClrLst meth="repeat">
+      <a:schemeClr val="accent5"/>
+    </dgm:linClrLst>
+    <dgm:effectClrLst/>
+    <dgm:txLinClrLst/>
+    <dgm:txFillClrLst meth="repeat">
+      <a:schemeClr val="tx1"/>
+    </dgm:txFillClrLst>
+    <dgm:txEffectClrLst/>
+  </dgm:styleLbl>
+  <dgm:styleLbl name="parChTrans1D2">
+    <dgm:fillClrLst meth="repeat">
+      <a:schemeClr val="accent6">
+        <a:tint val="90000"/>
+      </a:schemeClr>
+    </dgm:fillClrLst>
+    <dgm:linClrLst meth="repeat">
+      <a:schemeClr val="accent6"/>
+    </dgm:linClrLst>
+    <dgm:effectClrLst/>
+    <dgm:txLinClrLst/>
+    <dgm:txFillClrLst meth="repeat">
+      <a:schemeClr val="tx1"/>
+    </dgm:txFillClrLst>
+    <dgm:txEffectClrLst/>
+  </dgm:styleLbl>
+  <dgm:styleLbl name="parChTrans1D3">
+    <dgm:fillClrLst meth="repeat">
+      <a:schemeClr val="accent6">
+        <a:tint val="70000"/>
+      </a:schemeClr>
+    </dgm:fillClrLst>
+    <dgm:linClrLst meth="repeat">
+      <a:schemeClr val="accent1"/>
+    </dgm:linClrLst>
+    <dgm:effectClrLst/>
+    <dgm:txLinClrLst/>
+    <dgm:txFillClrLst meth="repeat">
+      <a:schemeClr val="tx1"/>
+    </dgm:txFillClrLst>
+    <dgm:txEffectClrLst/>
+  </dgm:styleLbl>
+  <dgm:styleLbl name="parChTrans1D4">
+    <dgm:fillClrLst meth="repeat">
+      <a:schemeClr val="accent6">
+        <a:tint val="50000"/>
+      </a:schemeClr>
+    </dgm:fillClrLst>
+    <dgm:linClrLst meth="repeat">
+      <a:schemeClr val="accent2"/>
+    </dgm:linClrLst>
+    <dgm:effectClrLst/>
+    <dgm:txLinClrLst/>
+    <dgm:txFillClrLst meth="repeat">
+      <a:schemeClr val="tx1"/>
+    </dgm:txFillClrLst>
+    <dgm:txEffectClrLst/>
+  </dgm:styleLbl>
+  <dgm:styleLbl name="fgAcc1">
+    <dgm:fillClrLst meth="repeat">
+      <a:schemeClr val="lt1">
+        <a:alpha val="90000"/>
+      </a:schemeClr>
+    </dgm:fillClrLst>
+    <dgm:linClrLst>
+      <a:schemeClr val="accent5"/>
+      <a:schemeClr val="accent6"/>
+    </dgm:linClrLst>
+    <dgm:effectClrLst/>
+    <dgm:txLinClrLst/>
+    <dgm:txFillClrLst meth="repeat">
+      <a:schemeClr val="dk1"/>
+    </dgm:txFillClrLst>
+    <dgm:txEffectClrLst/>
+  </dgm:styleLbl>
+  <dgm:styleLbl name="conFgAcc1">
+    <dgm:fillClrLst meth="repeat">
+      <a:schemeClr val="lt1">
+        <a:alpha val="90000"/>
+      </a:schemeClr>
+    </dgm:fillClrLst>
+    <dgm:linClrLst>
+      <a:schemeClr val="accent5"/>
+      <a:schemeClr val="accent6"/>
+    </dgm:linClrLst>
+    <dgm:effectClrLst/>
+    <dgm:txLinClrLst/>
+    <dgm:txFillClrLst meth="repeat">
+      <a:schemeClr val="dk1"/>
+    </dgm:txFillClrLst>
+    <dgm:txEffectClrLst/>
+  </dgm:styleLbl>
+  <dgm:styleLbl name="alignAcc1">
+    <dgm:fillClrLst meth="repeat">
+      <a:schemeClr val="lt1">
+        <a:alpha val="90000"/>
+      </a:schemeClr>
+    </dgm:fillClrLst>
+    <dgm:linClrLst>
+      <a:schemeClr val="accent5"/>
+      <a:schemeClr val="accent6"/>
+    </dgm:linClrLst>
+    <dgm:effectClrLst/>
+    <dgm:txLinClrLst/>
+    <dgm:txFillClrLst meth="repeat">
+      <a:schemeClr val="dk1"/>
+    </dgm:txFillClrLst>
+    <dgm:txEffectClrLst/>
+  </dgm:styleLbl>
+  <dgm:styleLbl name="trAlignAcc1">
+    <dgm:fillClrLst meth="repeat">
+      <a:schemeClr val="lt1">
+        <a:alpha val="40000"/>
+      </a:schemeClr>
+    </dgm:fillClrLst>
+    <dgm:linClrLst meth="repeat">
+      <a:schemeClr val="accent5"/>
+    </dgm:linClrLst>
+    <dgm:effectClrLst/>
+    <dgm:txLinClrLst/>
+    <dgm:txFillClrLst meth="repeat">
+      <a:schemeClr val="dk1"/>
+    </dgm:txFillClrLst>
+    <dgm:txEffectClrLst/>
+  </dgm:styleLbl>
+  <dgm:styleLbl name="bgAcc1">
+    <dgm:fillClrLst meth="repeat">
+      <a:schemeClr val="lt1">
+        <a:alpha val="90000"/>
+      </a:schemeClr>
+    </dgm:fillClrLst>
+    <dgm:linClrLst>
+      <a:schemeClr val="accent5"/>
+      <a:schemeClr val="accent6"/>
+    </dgm:linClrLst>
+    <dgm:effectClrLst/>
+    <dgm:txLinClrLst/>
+    <dgm:txFillClrLst meth="repeat">
+      <a:schemeClr val="dk1"/>
+    </dgm:txFillClrLst>
+    <dgm:txEffectClrLst/>
+  </dgm:styleLbl>
+  <dgm:styleLbl name="solidFgAcc1">
+    <dgm:fillClrLst meth="repeat">
+      <a:schemeClr val="lt1"/>
+    </dgm:fillClrLst>
+    <dgm:linClrLst>
+      <a:schemeClr val="accent5"/>
+      <a:schemeClr val="accent6"/>
+    </dgm:linClrLst>
+    <dgm:effectClrLst/>
+    <dgm:txLinClrLst/>
+    <dgm:txFillClrLst meth="repeat">
+      <a:schemeClr val="dk1"/>
+    </dgm:txFillClrLst>
+    <dgm:txEffectClrLst/>
+  </dgm:styleLbl>
+  <dgm:styleLbl name="solidAlignAcc1">
+    <dgm:fillClrLst meth="repeat">
+      <a:schemeClr val="lt1"/>
+    </dgm:fillClrLst>
+    <dgm:linClrLst>
+      <a:schemeClr val="accent5"/>
+      <a:schemeClr val="accent6"/>
+    </dgm:linClrLst>
+    <dgm:effectClrLst/>
+    <dgm:txLinClrLst/>
+    <dgm:txFillClrLst meth="repeat">
+      <a:schemeClr val="dk1"/>
+    </dgm:txFillClrLst>
+    <dgm:txEffectClrLst/>
+  </dgm:styleLbl>
+  <dgm:styleLbl name="solidBgAcc1">
+    <dgm:fillClrLst meth="repeat">
+      <a:schemeClr val="lt1"/>
+    </dgm:fillClrLst>
+    <dgm:linClrLst>
+      <a:schemeClr val="accent5"/>
+      <a:schemeClr val="accent6"/>
+    </dgm:linClrLst>
+    <dgm:effectClrLst/>
+    <dgm:txLinClrLst/>
+    <dgm:txFillClrLst meth="repeat">
+      <a:schemeClr val="dk1"/>
+    </dgm:txFillClrLst>
+    <dgm:txEffectClrLst/>
+  </dgm:styleLbl>
+  <dgm:styleLbl name="fgAccFollowNode1">
+    <dgm:fillClrLst>
+      <a:schemeClr val="accent5">
+        <a:tint val="40000"/>
+        <a:alpha val="90000"/>
+      </a:schemeClr>
+      <a:schemeClr val="accent6">
+        <a:tint val="40000"/>
+        <a:alpha val="90000"/>
+      </a:schemeClr>
+    </dgm:fillClrLst>
+    <dgm:linClrLst>
+      <a:schemeClr val="accent5">
+        <a:tint val="40000"/>
+        <a:alpha val="90000"/>
+      </a:schemeClr>
+      <a:schemeClr val="accent5">
+        <a:tint val="40000"/>
+        <a:alpha val="90000"/>
+      </a:schemeClr>
+    </dgm:linClrLst>
+    <dgm:effectClrLst/>
+    <dgm:txLinClrLst/>
+    <dgm:txFillClrLst meth="repeat">
+      <a:schemeClr val="dk1"/>
+    </dgm:txFillClrLst>
+    <dgm:txEffectClrLst/>
+  </dgm:styleLbl>
+  <dgm:styleLbl name="alignAccFollowNode1">
+    <dgm:fillClrLst>
+      <a:schemeClr val="accent5">
+        <a:tint val="40000"/>
+        <a:alpha val="90000"/>
+      </a:schemeClr>
+      <a:schemeClr val="accent6">
+        <a:tint val="40000"/>
+        <a:alpha val="90000"/>
+      </a:schemeClr>
+    </dgm:fillClrLst>
+    <dgm:linClrLst>
+      <a:schemeClr val="accent5">
+        <a:tint val="40000"/>
+        <a:alpha val="90000"/>
+      </a:schemeClr>
+      <a:schemeClr val="accent6">
+        <a:tint val="40000"/>
+        <a:alpha val="90000"/>
+      </a:schemeClr>
+    </dgm:linClrLst>
+    <dgm:effectClrLst/>
+    <dgm:txLinClrLst/>
+    <dgm:txFillClrLst meth="repeat">
+      <a:schemeClr val="dk1"/>
+    </dgm:txFillClrLst>
+    <dgm:txEffectClrLst/>
+  </dgm:styleLbl>
+  <dgm:styleLbl name="bgAccFollowNode1">
+    <dgm:fillClrLst>
+      <a:schemeClr val="accent5">
+        <a:tint val="40000"/>
+        <a:alpha val="90000"/>
+      </a:schemeClr>
+      <a:schemeClr val="accent6">
+        <a:tint val="40000"/>
+        <a:alpha val="90000"/>
+      </a:schemeClr>
+    </dgm:fillClrLst>
+    <dgm:linClrLst>
+      <a:schemeClr val="accent5">
+        <a:tint val="40000"/>
+        <a:alpha val="90000"/>
+      </a:schemeClr>
+      <a:schemeClr val="accent6">
+        <a:tint val="40000"/>
+        <a:alpha val="90000"/>
+      </a:schemeClr>
+    </dgm:linClrLst>
+    <dgm:effectClrLst/>
+    <dgm:txLinClrLst/>
+    <dgm:txFillClrLst meth="repeat">
+      <a:schemeClr val="dk1"/>
+    </dgm:txFillClrLst>
+    <dgm:txEffectClrLst/>
+  </dgm:styleLbl>
+  <dgm:styleLbl name="fgAcc0">
+    <dgm:fillClrLst meth="repeat">
+      <a:schemeClr val="lt1">
+        <a:alpha val="90000"/>
+      </a:schemeClr>
+    </dgm:fillClrLst>
+    <dgm:linClrLst>
+      <a:schemeClr val="accent4"/>
+    </dgm:linClrLst>
+    <dgm:effectClrLst/>
+    <dgm:txLinClrLst/>
+    <dgm:txFillClrLst meth="repeat">
+      <a:schemeClr val="dk1"/>
+    </dgm:txFillClrLst>
+    <dgm:txEffectClrLst/>
+  </dgm:styleLbl>
+  <dgm:styleLbl name="fgAcc2">
+    <dgm:fillClrLst meth="repeat">
+      <a:schemeClr val="lt1">
+        <a:alpha val="90000"/>
+      </a:schemeClr>
+    </dgm:fillClrLst>
+    <dgm:linClrLst>
+      <a:schemeClr val="accent6"/>
+    </dgm:linClrLst>
+    <dgm:effectClrLst/>
+    <dgm:txLinClrLst/>
+    <dgm:txFillClrLst meth="repeat">
+      <a:schemeClr val="dk1"/>
+    </dgm:txFillClrLst>
+    <dgm:txEffectClrLst/>
+  </dgm:styleLbl>
+  <dgm:styleLbl name="fgAcc3">
+    <dgm:fillClrLst meth="repeat">
+      <a:schemeClr val="lt1">
+        <a:alpha val="90000"/>
+      </a:schemeClr>
+    </dgm:fillClrLst>
+    <dgm:linClrLst>
+      <a:schemeClr val="accent1"/>
+    </dgm:linClrLst>
+    <dgm:effectClrLst/>
+    <dgm:txLinClrLst/>
+    <dgm:txFillClrLst meth="repeat">
+      <a:schemeClr val="dk1"/>
+    </dgm:txFillClrLst>
+    <dgm:txEffectClrLst/>
+  </dgm:styleLbl>
+  <dgm:styleLbl name="fgAcc4">
+    <dgm:fillClrLst meth="repeat">
+      <a:schemeClr val="lt1">
+        <a:alpha val="90000"/>
+      </a:schemeClr>
+    </dgm:fillClrLst>
+    <dgm:linClrLst>
+      <a:schemeClr val="accent2"/>
+    </dgm:linClrLst>
+    <dgm:effectClrLst/>
+    <dgm:txLinClrLst/>
+    <dgm:txFillClrLst meth="repeat">
+      <a:schemeClr val="dk1"/>
+    </dgm:txFillClrLst>
+    <dgm:txEffectClrLst/>
+  </dgm:styleLbl>
+  <dgm:styleLbl name="bgShp">
+    <dgm:fillClrLst meth="repeat">
+      <a:schemeClr val="accent5">
+        <a:tint val="40000"/>
+      </a:schemeClr>
+    </dgm:fillClrLst>
+    <dgm:linClrLst meth="repeat">
+      <a:schemeClr val="dk1"/>
+    </dgm:linClrLst>
+    <dgm:effectClrLst/>
+    <dgm:txLinClrLst/>
+    <dgm:txFillClrLst meth="repeat">
+      <a:schemeClr val="dk1"/>
+    </dgm:txFillClrLst>
+    <dgm:txEffectClrLst/>
+  </dgm:styleLbl>
+  <dgm:styleLbl name="dkBgShp">
+    <dgm:fillClrLst meth="repeat">
+      <a:schemeClr val="accent5">
+        <a:shade val="90000"/>
+      </a:schemeClr>
+    </dgm:fillClrLst>
+    <dgm:linClrLst meth="repeat">
+      <a:schemeClr val="dk1"/>
+    </dgm:linClrLst>
+    <dgm:effectClrLst/>
+    <dgm:txLinClrLst/>
+    <dgm:txFillClrLst meth="repeat">
+      <a:schemeClr val="lt1"/>
+    </dgm:txFillClrLst>
+    <dgm:txEffectClrLst/>
+  </dgm:styleLbl>
+  <dgm:styleLbl name="trBgShp">
+    <dgm:fillClrLst meth="repeat">
+      <a:schemeClr val="accent5">
+        <a:tint val="50000"/>
+        <a:alpha val="40000"/>
+      </a:schemeClr>
+    </dgm:fillClrLst>
+    <dgm:linClrLst meth="repeat">
+      <a:schemeClr val="accent5"/>
+    </dgm:linClrLst>
+    <dgm:effectClrLst/>
+    <dgm:txLinClrLst/>
+    <dgm:txFillClrLst meth="repeat">
+      <a:schemeClr val="lt1"/>
+    </dgm:txFillClrLst>
+    <dgm:txEffectClrLst/>
+  </dgm:styleLbl>
+  <dgm:styleLbl name="fgShp">
+    <dgm:fillClrLst meth="repeat">
+      <a:schemeClr val="accent5">
+        <a:tint val="40000"/>
+      </a:schemeClr>
+    </dgm:fillClrLst>
+    <dgm:linClrLst meth="repeat">
+      <a:schemeClr val="lt1"/>
+    </dgm:linClrLst>
+    <dgm:effectClrLst/>
+    <dgm:txLinClrLst/>
+    <dgm:txFillClrLst meth="repeat">
+      <a:schemeClr val="dk1"/>
+    </dgm:txFillClrLst>
+    <dgm:txEffectClrLst/>
+  </dgm:styleLbl>
+  <dgm:styleLbl name="revTx">
+    <dgm:fillClrLst meth="repeat">
+      <a:schemeClr val="lt1">
+        <a:alpha val="0"/>
+      </a:schemeClr>
+    </dgm:fillClrLst>
+    <dgm:linClrLst meth="repeat">
+      <a:schemeClr val="dk1">
+        <a:alpha val="0"/>
+      </a:schemeClr>
+    </dgm:linClrLst>
+    <dgm:effectClrLst/>
+    <dgm:txLinClrLst/>
+    <dgm:txFillClrLst meth="repeat">
+      <a:schemeClr val="tx1"/>
+    </dgm:txFillClrLst>
+    <dgm:txEffectClrLst/>
+  </dgm:styleLbl>
+</dgm:colorsDef>
+</file>
+
+<file path=ppt/diagrams/data1.xml><?xml version="1.0" encoding="utf-8"?>
+<dgm:dataModel xmlns:dgm="http://schemas.openxmlformats.org/drawingml/2006/diagram" xmlns:a="http://schemas.openxmlformats.org/drawingml/2006/main">
+  <dgm:ptLst>
+    <dgm:pt modelId="{292974CA-0953-4F18-B242-5CC1C4B6520F}" type="doc">
+      <dgm:prSet loTypeId="urn:microsoft.com/office/officeart/2005/8/layout/vList2" loCatId="list" qsTypeId="urn:microsoft.com/office/officeart/2005/8/quickstyle/simple1" qsCatId="simple" csTypeId="urn:microsoft.com/office/officeart/2005/8/colors/colorful5" csCatId="colorful"/>
+      <dgm:spPr/>
+      <dgm:t>
+        <a:bodyPr/>
+        <a:lstStyle/>
+        <a:p>
+          <a:endParaRPr lang="en-US"/>
+        </a:p>
+      </dgm:t>
+    </dgm:pt>
+    <dgm:pt modelId="{13C8A989-EB0F-47F0-8A85-B7BDA545B57C}">
+      <dgm:prSet/>
+      <dgm:spPr/>
+      <dgm:t>
+        <a:bodyPr/>
+        <a:lstStyle/>
+        <a:p>
+          <a:r>
+            <a:rPr lang="en-US"/>
+            <a:t>MongoDB</a:t>
+          </a:r>
+        </a:p>
+      </dgm:t>
+    </dgm:pt>
+    <dgm:pt modelId="{585325D8-009C-4613-9F69-7E3DB238858C}" type="parTrans" cxnId="{00A8B158-4BA2-4531-8875-75B59E155C05}">
+      <dgm:prSet/>
+      <dgm:spPr/>
+      <dgm:t>
+        <a:bodyPr/>
+        <a:lstStyle/>
+        <a:p>
+          <a:endParaRPr lang="en-US"/>
+        </a:p>
+      </dgm:t>
+    </dgm:pt>
+    <dgm:pt modelId="{2351E4F7-418B-4AEC-9C28-6FB93F5E06D1}" type="sibTrans" cxnId="{00A8B158-4BA2-4531-8875-75B59E155C05}">
+      <dgm:prSet/>
+      <dgm:spPr/>
+      <dgm:t>
+        <a:bodyPr/>
+        <a:lstStyle/>
+        <a:p>
+          <a:endParaRPr lang="en-US"/>
+        </a:p>
+      </dgm:t>
+    </dgm:pt>
+    <dgm:pt modelId="{EA3DA330-95B3-4D94-A047-96719F7EDE6E}">
+      <dgm:prSet/>
+      <dgm:spPr/>
+      <dgm:t>
+        <a:bodyPr/>
+        <a:lstStyle/>
+        <a:p>
+          <a:r>
+            <a:rPr lang="en-US"/>
+            <a:t>Express.js</a:t>
+          </a:r>
+        </a:p>
+      </dgm:t>
+    </dgm:pt>
+    <dgm:pt modelId="{02E4B0AF-C5A5-45F7-AFDF-F56EEE7D914E}" type="parTrans" cxnId="{47EFD5F0-55FC-4800-8CAB-67E52A48D0FA}">
+      <dgm:prSet/>
+      <dgm:spPr/>
+      <dgm:t>
+        <a:bodyPr/>
+        <a:lstStyle/>
+        <a:p>
+          <a:endParaRPr lang="en-US"/>
+        </a:p>
+      </dgm:t>
+    </dgm:pt>
+    <dgm:pt modelId="{66FCFEED-8FA9-4BB8-8677-C93C96DC4854}" type="sibTrans" cxnId="{47EFD5F0-55FC-4800-8CAB-67E52A48D0FA}">
+      <dgm:prSet/>
+      <dgm:spPr/>
+      <dgm:t>
+        <a:bodyPr/>
+        <a:lstStyle/>
+        <a:p>
+          <a:endParaRPr lang="en-US"/>
+        </a:p>
+      </dgm:t>
+    </dgm:pt>
+    <dgm:pt modelId="{0560BBFC-266A-4B40-BDA9-B0D807AEE45C}">
+      <dgm:prSet/>
+      <dgm:spPr/>
+      <dgm:t>
+        <a:bodyPr/>
+        <a:lstStyle/>
+        <a:p>
+          <a:r>
+            <a:rPr lang="en-US"/>
+            <a:t>React</a:t>
+          </a:r>
+        </a:p>
+      </dgm:t>
+    </dgm:pt>
+    <dgm:pt modelId="{477B0991-46CB-4753-A58A-EE353FAF1A4A}" type="parTrans" cxnId="{41A42125-4096-4022-8040-3B8E8917C08D}">
+      <dgm:prSet/>
+      <dgm:spPr/>
+      <dgm:t>
+        <a:bodyPr/>
+        <a:lstStyle/>
+        <a:p>
+          <a:endParaRPr lang="en-US"/>
+        </a:p>
+      </dgm:t>
+    </dgm:pt>
+    <dgm:pt modelId="{58E3A335-30F7-418B-84DE-6DEFA4B28ED6}" type="sibTrans" cxnId="{41A42125-4096-4022-8040-3B8E8917C08D}">
+      <dgm:prSet/>
+      <dgm:spPr/>
+      <dgm:t>
+        <a:bodyPr/>
+        <a:lstStyle/>
+        <a:p>
+          <a:endParaRPr lang="en-US"/>
+        </a:p>
+      </dgm:t>
+    </dgm:pt>
+    <dgm:pt modelId="{45622098-8D55-4084-AA06-94C28AFC237E}">
+      <dgm:prSet/>
+      <dgm:spPr/>
+      <dgm:t>
+        <a:bodyPr/>
+        <a:lstStyle/>
+        <a:p>
+          <a:r>
+            <a:rPr lang="en-US"/>
+            <a:t>Node.js</a:t>
+          </a:r>
+        </a:p>
+      </dgm:t>
+    </dgm:pt>
+    <dgm:pt modelId="{FDACD55B-3126-4C0C-8459-9628EA1C1318}" type="parTrans" cxnId="{DD9267D2-FEA9-4323-92FF-DEDECA50B3E1}">
+      <dgm:prSet/>
+      <dgm:spPr/>
+      <dgm:t>
+        <a:bodyPr/>
+        <a:lstStyle/>
+        <a:p>
+          <a:endParaRPr lang="en-US"/>
+        </a:p>
+      </dgm:t>
+    </dgm:pt>
+    <dgm:pt modelId="{22622E20-29F9-470C-83F0-F4BEF3ED44C3}" type="sibTrans" cxnId="{DD9267D2-FEA9-4323-92FF-DEDECA50B3E1}">
+      <dgm:prSet/>
+      <dgm:spPr/>
+      <dgm:t>
+        <a:bodyPr/>
+        <a:lstStyle/>
+        <a:p>
+          <a:endParaRPr lang="en-US"/>
+        </a:p>
+      </dgm:t>
+    </dgm:pt>
+    <dgm:pt modelId="{5BE2B2D5-057F-48A8-A675-401B51EFF323}" type="pres">
+      <dgm:prSet presAssocID="{292974CA-0953-4F18-B242-5CC1C4B6520F}" presName="linear" presStyleCnt="0">
+        <dgm:presLayoutVars>
+          <dgm:animLvl val="lvl"/>
+          <dgm:resizeHandles val="exact"/>
+        </dgm:presLayoutVars>
+      </dgm:prSet>
+      <dgm:spPr/>
+    </dgm:pt>
+    <dgm:pt modelId="{ACCDC911-4B96-458E-A11B-EAF68A9557F8}" type="pres">
+      <dgm:prSet presAssocID="{13C8A989-EB0F-47F0-8A85-B7BDA545B57C}" presName="parentText" presStyleLbl="node1" presStyleIdx="0" presStyleCnt="4">
+        <dgm:presLayoutVars>
+          <dgm:chMax val="0"/>
+          <dgm:bulletEnabled val="1"/>
+        </dgm:presLayoutVars>
+      </dgm:prSet>
+      <dgm:spPr/>
+    </dgm:pt>
+    <dgm:pt modelId="{36AAA679-415E-4C37-A6F9-5A35C9DD8E39}" type="pres">
+      <dgm:prSet presAssocID="{2351E4F7-418B-4AEC-9C28-6FB93F5E06D1}" presName="spacer" presStyleCnt="0"/>
+      <dgm:spPr/>
+    </dgm:pt>
+    <dgm:pt modelId="{9A3F9913-4A88-45BA-8B90-C1F6514B9121}" type="pres">
+      <dgm:prSet presAssocID="{EA3DA330-95B3-4D94-A047-96719F7EDE6E}" presName="parentText" presStyleLbl="node1" presStyleIdx="1" presStyleCnt="4">
+        <dgm:presLayoutVars>
+          <dgm:chMax val="0"/>
+          <dgm:bulletEnabled val="1"/>
+        </dgm:presLayoutVars>
+      </dgm:prSet>
+      <dgm:spPr/>
+    </dgm:pt>
+    <dgm:pt modelId="{A29F7214-69A2-43C6-AF3A-0064D864189F}" type="pres">
+      <dgm:prSet presAssocID="{66FCFEED-8FA9-4BB8-8677-C93C96DC4854}" presName="spacer" presStyleCnt="0"/>
+      <dgm:spPr/>
+    </dgm:pt>
+    <dgm:pt modelId="{E8BA136C-CFB3-4E59-8E32-0443DD2159D2}" type="pres">
+      <dgm:prSet presAssocID="{0560BBFC-266A-4B40-BDA9-B0D807AEE45C}" presName="parentText" presStyleLbl="node1" presStyleIdx="2" presStyleCnt="4">
+        <dgm:presLayoutVars>
+          <dgm:chMax val="0"/>
+          <dgm:bulletEnabled val="1"/>
+        </dgm:presLayoutVars>
+      </dgm:prSet>
+      <dgm:spPr/>
+    </dgm:pt>
+    <dgm:pt modelId="{99706CDC-60FA-405E-B1C1-80368A26D2CA}" type="pres">
+      <dgm:prSet presAssocID="{58E3A335-30F7-418B-84DE-6DEFA4B28ED6}" presName="spacer" presStyleCnt="0"/>
+      <dgm:spPr/>
+    </dgm:pt>
+    <dgm:pt modelId="{E444EB68-0DD3-4450-8A82-1EAB20909A21}" type="pres">
+      <dgm:prSet presAssocID="{45622098-8D55-4084-AA06-94C28AFC237E}" presName="parentText" presStyleLbl="node1" presStyleIdx="3" presStyleCnt="4">
+        <dgm:presLayoutVars>
+          <dgm:chMax val="0"/>
+          <dgm:bulletEnabled val="1"/>
+        </dgm:presLayoutVars>
+      </dgm:prSet>
+      <dgm:spPr/>
+    </dgm:pt>
+  </dgm:ptLst>
+  <dgm:cxnLst>
+    <dgm:cxn modelId="{41A42125-4096-4022-8040-3B8E8917C08D}" srcId="{292974CA-0953-4F18-B242-5CC1C4B6520F}" destId="{0560BBFC-266A-4B40-BDA9-B0D807AEE45C}" srcOrd="2" destOrd="0" parTransId="{477B0991-46CB-4753-A58A-EE353FAF1A4A}" sibTransId="{58E3A335-30F7-418B-84DE-6DEFA4B28ED6}"/>
+    <dgm:cxn modelId="{00A8B158-4BA2-4531-8875-75B59E155C05}" srcId="{292974CA-0953-4F18-B242-5CC1C4B6520F}" destId="{13C8A989-EB0F-47F0-8A85-B7BDA545B57C}" srcOrd="0" destOrd="0" parTransId="{585325D8-009C-4613-9F69-7E3DB238858C}" sibTransId="{2351E4F7-418B-4AEC-9C28-6FB93F5E06D1}"/>
+    <dgm:cxn modelId="{7C7E9186-DAE7-4F75-AF08-DA2290B0965D}" type="presOf" srcId="{13C8A989-EB0F-47F0-8A85-B7BDA545B57C}" destId="{ACCDC911-4B96-458E-A11B-EAF68A9557F8}" srcOrd="0" destOrd="0" presId="urn:microsoft.com/office/officeart/2005/8/layout/vList2"/>
+    <dgm:cxn modelId="{16DCF086-F618-4C60-954A-C0FEEE717B44}" type="presOf" srcId="{292974CA-0953-4F18-B242-5CC1C4B6520F}" destId="{5BE2B2D5-057F-48A8-A675-401B51EFF323}" srcOrd="0" destOrd="0" presId="urn:microsoft.com/office/officeart/2005/8/layout/vList2"/>
+    <dgm:cxn modelId="{12F3DE8E-8AF0-45B0-B08F-BDB4379C1F56}" type="presOf" srcId="{45622098-8D55-4084-AA06-94C28AFC237E}" destId="{E444EB68-0DD3-4450-8A82-1EAB20909A21}" srcOrd="0" destOrd="0" presId="urn:microsoft.com/office/officeart/2005/8/layout/vList2"/>
+    <dgm:cxn modelId="{B4BE6DB8-5F84-4162-95B6-02D4BEE9188B}" type="presOf" srcId="{0560BBFC-266A-4B40-BDA9-B0D807AEE45C}" destId="{E8BA136C-CFB3-4E59-8E32-0443DD2159D2}" srcOrd="0" destOrd="0" presId="urn:microsoft.com/office/officeart/2005/8/layout/vList2"/>
+    <dgm:cxn modelId="{DD9267D2-FEA9-4323-92FF-DEDECA50B3E1}" srcId="{292974CA-0953-4F18-B242-5CC1C4B6520F}" destId="{45622098-8D55-4084-AA06-94C28AFC237E}" srcOrd="3" destOrd="0" parTransId="{FDACD55B-3126-4C0C-8459-9628EA1C1318}" sibTransId="{22622E20-29F9-470C-83F0-F4BEF3ED44C3}"/>
+    <dgm:cxn modelId="{A9245BE3-65F3-47EA-928D-6502D276FADD}" type="presOf" srcId="{EA3DA330-95B3-4D94-A047-96719F7EDE6E}" destId="{9A3F9913-4A88-45BA-8B90-C1F6514B9121}" srcOrd="0" destOrd="0" presId="urn:microsoft.com/office/officeart/2005/8/layout/vList2"/>
+    <dgm:cxn modelId="{47EFD5F0-55FC-4800-8CAB-67E52A48D0FA}" srcId="{292974CA-0953-4F18-B242-5CC1C4B6520F}" destId="{EA3DA330-95B3-4D94-A047-96719F7EDE6E}" srcOrd="1" destOrd="0" parTransId="{02E4B0AF-C5A5-45F7-AFDF-F56EEE7D914E}" sibTransId="{66FCFEED-8FA9-4BB8-8677-C93C96DC4854}"/>
+    <dgm:cxn modelId="{10EACE25-A9E9-4D95-B8F3-4BA5AAF8EF37}" type="presParOf" srcId="{5BE2B2D5-057F-48A8-A675-401B51EFF323}" destId="{ACCDC911-4B96-458E-A11B-EAF68A9557F8}" srcOrd="0" destOrd="0" presId="urn:microsoft.com/office/officeart/2005/8/layout/vList2"/>
+    <dgm:cxn modelId="{165BAA9E-5FE3-48B1-B421-C4994938FCE5}" type="presParOf" srcId="{5BE2B2D5-057F-48A8-A675-401B51EFF323}" destId="{36AAA679-415E-4C37-A6F9-5A35C9DD8E39}" srcOrd="1" destOrd="0" presId="urn:microsoft.com/office/officeart/2005/8/layout/vList2"/>
+    <dgm:cxn modelId="{C3596BB1-C8CC-41F4-91F7-F713C97D5D45}" type="presParOf" srcId="{5BE2B2D5-057F-48A8-A675-401B51EFF323}" destId="{9A3F9913-4A88-45BA-8B90-C1F6514B9121}" srcOrd="2" destOrd="0" presId="urn:microsoft.com/office/officeart/2005/8/layout/vList2"/>
+    <dgm:cxn modelId="{B428C63F-B2A7-4EB7-A0A5-1996CC5F6D0D}" type="presParOf" srcId="{5BE2B2D5-057F-48A8-A675-401B51EFF323}" destId="{A29F7214-69A2-43C6-AF3A-0064D864189F}" srcOrd="3" destOrd="0" presId="urn:microsoft.com/office/officeart/2005/8/layout/vList2"/>
+    <dgm:cxn modelId="{2A0C9C1B-3B24-483C-BAB4-C41B378FFD91}" type="presParOf" srcId="{5BE2B2D5-057F-48A8-A675-401B51EFF323}" destId="{E8BA136C-CFB3-4E59-8E32-0443DD2159D2}" srcOrd="4" destOrd="0" presId="urn:microsoft.com/office/officeart/2005/8/layout/vList2"/>
+    <dgm:cxn modelId="{FD498967-3050-4110-9712-266E236FCDB2}" type="presParOf" srcId="{5BE2B2D5-057F-48A8-A675-401B51EFF323}" destId="{99706CDC-60FA-405E-B1C1-80368A26D2CA}" srcOrd="5" destOrd="0" presId="urn:microsoft.com/office/officeart/2005/8/layout/vList2"/>
+    <dgm:cxn modelId="{CDC75E84-11EF-460E-B0DD-42DC06A98A3D}" type="presParOf" srcId="{5BE2B2D5-057F-48A8-A675-401B51EFF323}" destId="{E444EB68-0DD3-4450-8A82-1EAB20909A21}" srcOrd="6" destOrd="0" presId="urn:microsoft.com/office/officeart/2005/8/layout/vList2"/>
+  </dgm:cxnLst>
+  <dgm:bg/>
+  <dgm:whole/>
+  <dgm:extLst>
+    <a:ext uri="http://schemas.microsoft.com/office/drawing/2008/diagram">
+      <dsp:dataModelExt xmlns:dsp="http://schemas.microsoft.com/office/drawing/2008/diagram" relId="rId6" minVer="http://schemas.openxmlformats.org/drawingml/2006/diagram"/>
+    </a:ext>
+  </dgm:extLst>
+</dgm:dataModel>
+</file>
+
+<file path=ppt/diagrams/drawing1.xml><?xml version="1.0" encoding="utf-8"?>
+<dsp:drawing xmlns:dgm="http://schemas.openxmlformats.org/drawingml/2006/diagram" xmlns:dsp="http://schemas.microsoft.com/office/drawing/2008/diagram" xmlns:a="http://schemas.openxmlformats.org/drawingml/2006/main">
+  <dsp:spTree>
+    <dsp:nvGrpSpPr>
+      <dsp:cNvPr id="0" name=""/>
+      <dsp:cNvGrpSpPr/>
+    </dsp:nvGrpSpPr>
+    <dsp:grpSpPr/>
+    <dsp:sp modelId="{ACCDC911-4B96-458E-A11B-EAF68A9557F8}">
+      <dsp:nvSpPr>
+        <dsp:cNvPr id="0" name=""/>
+        <dsp:cNvSpPr/>
+      </dsp:nvSpPr>
+      <dsp:spPr>
+        <a:xfrm>
+          <a:off x="0" y="14472"/>
+          <a:ext cx="6513603" cy="1343160"/>
+        </a:xfrm>
+        <a:prstGeom prst="roundRect">
+          <a:avLst/>
+        </a:prstGeom>
+        <a:solidFill>
+          <a:schemeClr val="accent5">
+            <a:hueOff val="0"/>
+            <a:satOff val="0"/>
+            <a:lumOff val="0"/>
+            <a:alphaOff val="0"/>
+          </a:schemeClr>
+        </a:solidFill>
+        <a:ln w="12700" cap="flat" cmpd="sng" algn="ctr">
+          <a:solidFill>
+            <a:schemeClr val="lt1">
+              <a:hueOff val="0"/>
+              <a:satOff val="0"/>
+              <a:lumOff val="0"/>
+              <a:alphaOff val="0"/>
+            </a:schemeClr>
+          </a:solidFill>
+          <a:prstDash val="solid"/>
+          <a:miter lim="800000"/>
+        </a:ln>
+        <a:effectLst/>
+      </dsp:spPr>
+      <dsp:style>
+        <a:lnRef idx="2">
+          <a:scrgbClr r="0" g="0" b="0"/>
+        </a:lnRef>
+        <a:fillRef idx="1">
+          <a:scrgbClr r="0" g="0" b="0"/>
+        </a:fillRef>
+        <a:effectRef idx="0">
+          <a:scrgbClr r="0" g="0" b="0"/>
+        </a:effectRef>
+        <a:fontRef idx="minor">
+          <a:schemeClr val="lt1"/>
+        </a:fontRef>
+      </dsp:style>
+      <dsp:txBody>
+        <a:bodyPr spcFirstLastPara="0" vert="horz" wrap="square" lIns="213360" tIns="213360" rIns="213360" bIns="213360" numCol="1" spcCol="1270" anchor="ctr" anchorCtr="0">
+          <a:noAutofit/>
+        </a:bodyPr>
+        <a:lstStyle/>
+        <a:p>
+          <a:pPr marL="0" lvl="0" indent="0" algn="l" defTabSz="2489200">
+            <a:lnSpc>
+              <a:spcPct val="90000"/>
+            </a:lnSpc>
+            <a:spcBef>
+              <a:spcPct val="0"/>
+            </a:spcBef>
+            <a:spcAft>
+              <a:spcPct val="35000"/>
+            </a:spcAft>
+            <a:buNone/>
+          </a:pPr>
+          <a:r>
+            <a:rPr lang="en-US" sz="5600" kern="1200"/>
+            <a:t>MongoDB</a:t>
+          </a:r>
+        </a:p>
+      </dsp:txBody>
+      <dsp:txXfrm>
+        <a:off x="65568" y="80040"/>
+        <a:ext cx="6382467" cy="1212024"/>
+      </dsp:txXfrm>
+    </dsp:sp>
+    <dsp:sp modelId="{9A3F9913-4A88-45BA-8B90-C1F6514B9121}">
+      <dsp:nvSpPr>
+        <dsp:cNvPr id="0" name=""/>
+        <dsp:cNvSpPr/>
+      </dsp:nvSpPr>
+      <dsp:spPr>
+        <a:xfrm>
+          <a:off x="0" y="1518913"/>
+          <a:ext cx="6513603" cy="1343160"/>
+        </a:xfrm>
+        <a:prstGeom prst="roundRect">
+          <a:avLst/>
+        </a:prstGeom>
+        <a:solidFill>
+          <a:schemeClr val="accent5">
+            <a:hueOff val="-2252848"/>
+            <a:satOff val="-5806"/>
+            <a:lumOff val="-3922"/>
+            <a:alphaOff val="0"/>
+          </a:schemeClr>
+        </a:solidFill>
+        <a:ln w="12700" cap="flat" cmpd="sng" algn="ctr">
+          <a:solidFill>
+            <a:schemeClr val="lt1">
+              <a:hueOff val="0"/>
+              <a:satOff val="0"/>
+              <a:lumOff val="0"/>
+              <a:alphaOff val="0"/>
+            </a:schemeClr>
+          </a:solidFill>
+          <a:prstDash val="solid"/>
+          <a:miter lim="800000"/>
+        </a:ln>
+        <a:effectLst/>
+      </dsp:spPr>
+      <dsp:style>
+        <a:lnRef idx="2">
+          <a:scrgbClr r="0" g="0" b="0"/>
+        </a:lnRef>
+        <a:fillRef idx="1">
+          <a:scrgbClr r="0" g="0" b="0"/>
+        </a:fillRef>
+        <a:effectRef idx="0">
+          <a:scrgbClr r="0" g="0" b="0"/>
+        </a:effectRef>
+        <a:fontRef idx="minor">
+          <a:schemeClr val="lt1"/>
+        </a:fontRef>
+      </dsp:style>
+      <dsp:txBody>
+        <a:bodyPr spcFirstLastPara="0" vert="horz" wrap="square" lIns="213360" tIns="213360" rIns="213360" bIns="213360" numCol="1" spcCol="1270" anchor="ctr" anchorCtr="0">
+          <a:noAutofit/>
+        </a:bodyPr>
+        <a:lstStyle/>
+        <a:p>
+          <a:pPr marL="0" lvl="0" indent="0" algn="l" defTabSz="2489200">
+            <a:lnSpc>
+              <a:spcPct val="90000"/>
+            </a:lnSpc>
+            <a:spcBef>
+              <a:spcPct val="0"/>
+            </a:spcBef>
+            <a:spcAft>
+              <a:spcPct val="35000"/>
+            </a:spcAft>
+            <a:buNone/>
+          </a:pPr>
+          <a:r>
+            <a:rPr lang="en-US" sz="5600" kern="1200"/>
+            <a:t>Express.js</a:t>
+          </a:r>
+        </a:p>
+      </dsp:txBody>
+      <dsp:txXfrm>
+        <a:off x="65568" y="1584481"/>
+        <a:ext cx="6382467" cy="1212024"/>
+      </dsp:txXfrm>
+    </dsp:sp>
+    <dsp:sp modelId="{E8BA136C-CFB3-4E59-8E32-0443DD2159D2}">
+      <dsp:nvSpPr>
+        <dsp:cNvPr id="0" name=""/>
+        <dsp:cNvSpPr/>
+      </dsp:nvSpPr>
+      <dsp:spPr>
+        <a:xfrm>
+          <a:off x="0" y="3023353"/>
+          <a:ext cx="6513603" cy="1343160"/>
+        </a:xfrm>
+        <a:prstGeom prst="roundRect">
+          <a:avLst/>
+        </a:prstGeom>
+        <a:solidFill>
+          <a:schemeClr val="accent5">
+            <a:hueOff val="-4505695"/>
+            <a:satOff val="-11613"/>
+            <a:lumOff val="-7843"/>
+            <a:alphaOff val="0"/>
+          </a:schemeClr>
+        </a:solidFill>
+        <a:ln w="12700" cap="flat" cmpd="sng" algn="ctr">
+          <a:solidFill>
+            <a:schemeClr val="lt1">
+              <a:hueOff val="0"/>
+              <a:satOff val="0"/>
+              <a:lumOff val="0"/>
+              <a:alphaOff val="0"/>
+            </a:schemeClr>
+          </a:solidFill>
+          <a:prstDash val="solid"/>
+          <a:miter lim="800000"/>
+        </a:ln>
+        <a:effectLst/>
+      </dsp:spPr>
+      <dsp:style>
+        <a:lnRef idx="2">
+          <a:scrgbClr r="0" g="0" b="0"/>
+        </a:lnRef>
+        <a:fillRef idx="1">
+          <a:scrgbClr r="0" g="0" b="0"/>
+        </a:fillRef>
+        <a:effectRef idx="0">
+          <a:scrgbClr r="0" g="0" b="0"/>
+        </a:effectRef>
+        <a:fontRef idx="minor">
+          <a:schemeClr val="lt1"/>
+        </a:fontRef>
+      </dsp:style>
+      <dsp:txBody>
+        <a:bodyPr spcFirstLastPara="0" vert="horz" wrap="square" lIns="213360" tIns="213360" rIns="213360" bIns="213360" numCol="1" spcCol="1270" anchor="ctr" anchorCtr="0">
+          <a:noAutofit/>
+        </a:bodyPr>
+        <a:lstStyle/>
+        <a:p>
+          <a:pPr marL="0" lvl="0" indent="0" algn="l" defTabSz="2489200">
+            <a:lnSpc>
+              <a:spcPct val="90000"/>
+            </a:lnSpc>
+            <a:spcBef>
+              <a:spcPct val="0"/>
+            </a:spcBef>
+            <a:spcAft>
+              <a:spcPct val="35000"/>
+            </a:spcAft>
+            <a:buNone/>
+          </a:pPr>
+          <a:r>
+            <a:rPr lang="en-US" sz="5600" kern="1200"/>
+            <a:t>React</a:t>
+          </a:r>
+        </a:p>
+      </dsp:txBody>
+      <dsp:txXfrm>
+        <a:off x="65568" y="3088921"/>
+        <a:ext cx="6382467" cy="1212024"/>
+      </dsp:txXfrm>
+    </dsp:sp>
+    <dsp:sp modelId="{E444EB68-0DD3-4450-8A82-1EAB20909A21}">
+      <dsp:nvSpPr>
+        <dsp:cNvPr id="0" name=""/>
+        <dsp:cNvSpPr/>
+      </dsp:nvSpPr>
+      <dsp:spPr>
+        <a:xfrm>
+          <a:off x="0" y="4527793"/>
+          <a:ext cx="6513603" cy="1343160"/>
+        </a:xfrm>
+        <a:prstGeom prst="roundRect">
+          <a:avLst/>
+        </a:prstGeom>
+        <a:solidFill>
+          <a:schemeClr val="accent5">
+            <a:hueOff val="-6758543"/>
+            <a:satOff val="-17419"/>
+            <a:lumOff val="-11765"/>
+            <a:alphaOff val="0"/>
+          </a:schemeClr>
+        </a:solidFill>
+        <a:ln w="12700" cap="flat" cmpd="sng" algn="ctr">
+          <a:solidFill>
+            <a:schemeClr val="lt1">
+              <a:hueOff val="0"/>
+              <a:satOff val="0"/>
+              <a:lumOff val="0"/>
+              <a:alphaOff val="0"/>
+            </a:schemeClr>
+          </a:solidFill>
+          <a:prstDash val="solid"/>
+          <a:miter lim="800000"/>
+        </a:ln>
+        <a:effectLst/>
+      </dsp:spPr>
+      <dsp:style>
+        <a:lnRef idx="2">
+          <a:scrgbClr r="0" g="0" b="0"/>
+        </a:lnRef>
+        <a:fillRef idx="1">
+          <a:scrgbClr r="0" g="0" b="0"/>
+        </a:fillRef>
+        <a:effectRef idx="0">
+          <a:scrgbClr r="0" g="0" b="0"/>
+        </a:effectRef>
+        <a:fontRef idx="minor">
+          <a:schemeClr val="lt1"/>
+        </a:fontRef>
+      </dsp:style>
+      <dsp:txBody>
+        <a:bodyPr spcFirstLastPara="0" vert="horz" wrap="square" lIns="213360" tIns="213360" rIns="213360" bIns="213360" numCol="1" spcCol="1270" anchor="ctr" anchorCtr="0">
+          <a:noAutofit/>
+        </a:bodyPr>
+        <a:lstStyle/>
+        <a:p>
+          <a:pPr marL="0" lvl="0" indent="0" algn="l" defTabSz="2489200">
+            <a:lnSpc>
+              <a:spcPct val="90000"/>
+            </a:lnSpc>
+            <a:spcBef>
+              <a:spcPct val="0"/>
+            </a:spcBef>
+            <a:spcAft>
+              <a:spcPct val="35000"/>
+            </a:spcAft>
+            <a:buNone/>
+          </a:pPr>
+          <a:r>
+            <a:rPr lang="en-US" sz="5600" kern="1200"/>
+            <a:t>Node.js</a:t>
+          </a:r>
+        </a:p>
+      </dsp:txBody>
+      <dsp:txXfrm>
+        <a:off x="65568" y="4593361"/>
+        <a:ext cx="6382467" cy="1212024"/>
+      </dsp:txXfrm>
+    </dsp:sp>
+  </dsp:spTree>
+</dsp:drawing>
+</file>
+
+<file path=ppt/diagrams/layout1.xml><?xml version="1.0" encoding="utf-8"?>
+<dgm:layoutDef xmlns:dgm="http://schemas.openxmlformats.org/drawingml/2006/diagram" xmlns:a="http://schemas.openxmlformats.org/drawingml/2006/main" uniqueId="urn:microsoft.com/office/officeart/2005/8/layout/vList2">
+  <dgm:title val=""/>
+  <dgm:desc val=""/>
+  <dgm:catLst>
+    <dgm:cat type="list" pri="3000"/>
+    <dgm:cat type="convert" pri="1000"/>
+  </dgm:catLst>
+  <dgm:sampData>
+    <dgm:dataModel>
+      <dgm:ptLst>
+        <dgm:pt modelId="0" type="doc"/>
+        <dgm:pt modelId="1">
+          <dgm:prSet phldr="1"/>
+        </dgm:pt>
+        <dgm:pt modelId="11">
+          <dgm:prSet phldr="1"/>
+        </dgm:pt>
+        <dgm:pt modelId="2">
+          <dgm:prSet phldr="1"/>
+        </dgm:pt>
+        <dgm:pt modelId="21">
+          <dgm:prSet phldr="1"/>
+        </dgm:pt>
+      </dgm:ptLst>
+      <dgm:cxnLst>
+        <dgm:cxn modelId="4" srcId="0" destId="1" srcOrd="0" destOrd="0"/>
+        <dgm:cxn modelId="5" srcId="0" destId="2" srcOrd="1" destOrd="0"/>
+        <dgm:cxn modelId="12" srcId="1" destId="11" srcOrd="0" destOrd="0"/>
+        <dgm:cxn modelId="23" srcId="2" destId="21" srcOrd="0" destOrd="0"/>
+      </dgm:cxnLst>
+      <dgm:bg/>
+      <dgm:whole/>
+    </dgm:dataModel>
+  </dgm:sampData>
+  <dgm:styleData>
+    <dgm:dataModel>
+      <dgm:ptLst>
+        <dgm:pt modelId="0" type="doc"/>
+        <dgm:pt modelId="1"/>
+        <dgm:pt modelId="2"/>
+      </dgm:ptLst>
+      <dgm:cxnLst>
+        <dgm:cxn modelId="3" srcId="0" destId="1" srcOrd="0" destOrd="0"/>
+        <dgm:cxn modelId="4" srcId="0" destId="2" srcOrd="1" destOrd="0"/>
+      </dgm:cxnLst>
+      <dgm:bg/>
+      <dgm:whole/>
+    </dgm:dataModel>
+  </dgm:styleData>
+  <dgm:clrData>
+    <dgm:dataModel>
+      <dgm:ptLst>
+        <dgm:pt modelId="0" type="doc"/>
+        <dgm:pt modelId="1"/>
+        <dgm:pt modelId="2"/>
+        <dgm:pt modelId="3"/>
+        <dgm:pt modelId="4"/>
+      </dgm:ptLst>
+      <dgm:cxnLst>
+        <dgm:cxn modelId="5" srcId="0" destId="1" srcOrd="0" destOrd="0"/>
+        <dgm:cxn modelId="6" srcId="0" destId="2" srcOrd="1" destOrd="0"/>
+        <dgm:cxn modelId="7" srcId="0" destId="3" srcOrd="2" destOrd="0"/>
+        <dgm:cxn modelId="8" srcId="0" destId="4" srcOrd="3" destOrd="0"/>
+      </dgm:cxnLst>
+      <dgm:bg/>
+      <dgm:whole/>
+    </dgm:dataModel>
+  </dgm:clrData>
+  <dgm:layoutNode name="linear">
+    <dgm:varLst>
+      <dgm:animLvl val="lvl"/>
+      <dgm:resizeHandles val="exact"/>
+    </dgm:varLst>
+    <dgm:alg type="lin">
+      <dgm:param type="linDir" val="fromT"/>
+      <dgm:param type="vertAlign" val="mid"/>
+    </dgm:alg>
+    <dgm:shape xmlns:r="http://schemas.openxmlformats.org/officeDocument/2006/relationships" r:blip="">
+      <dgm:adjLst/>
+    </dgm:shape>
+    <dgm:presOf/>
+    <dgm:constrLst>
+      <dgm:constr type="w" for="ch" forName="parentText" refType="w"/>
+      <dgm:constr type="h" for="ch" forName="parentText" refType="primFontSz" refFor="ch" refForName="parentText" fact="0.52"/>
+      <dgm:constr type="w" for="ch" forName="childText" refType="w"/>
+      <dgm:constr type="h" for="ch" forName="childText" refType="primFontSz" refFor="ch" refForName="parentText" fact="0.46"/>
+      <dgm:constr type="h" for="ch" forName="parentText" op="equ"/>
+      <dgm:constr type="primFontSz" for="ch" forName="parentText" op="equ" val="65"/>
+      <dgm:constr type="primFontSz" for="ch" forName="childText" refType="primFontSz" refFor="ch" refForName="parentText" op="equ"/>
+      <dgm:constr type="h" for="ch" forName="spacer" refType="primFontSz" refFor="ch" refForName="parentText" fact="0.08"/>
+    </dgm:constrLst>
+    <dgm:ruleLst>
+      <dgm:rule type="primFontSz" for="ch" forName="parentText" val="5" fact="NaN" max="NaN"/>
+    </dgm:ruleLst>
+    <dgm:forEach name="Name0" axis="ch" ptType="node">
+      <dgm:layoutNode name="parentText" styleLbl="node1">
+        <dgm:varLst>
+          <dgm:chMax val="0"/>
+          <dgm:bulletEnabled val="1"/>
+        </dgm:varLst>
+        <dgm:alg type="tx">
+          <dgm:param type="parTxLTRAlign" val="l"/>
+          <dgm:param type="parTxRTLAlign" val="r"/>
+        </dgm:alg>
+        <dgm:shape xmlns:r="http://schemas.openxmlformats.org/officeDocument/2006/relationships" type="roundRect" r:blip="">
+          <dgm:adjLst/>
+        </dgm:shape>
+        <dgm:presOf axis="self"/>
+        <dgm:constrLst>
+          <dgm:constr type="tMarg" refType="primFontSz" fact="0.3"/>
+          <dgm:constr type="bMarg" refType="primFontSz" fact="0.3"/>
+          <dgm:constr type="lMarg" refType="primFontSz" fact="0.3"/>
+          <dgm:constr type="rMarg" refType="primFontSz" fact="0.3"/>
+        </dgm:constrLst>
+        <dgm:ruleLst>
+          <dgm:rule type="h" val="INF" fact="NaN" max="NaN"/>
+        </dgm:ruleLst>
+      </dgm:layoutNode>
+      <dgm:choose name="Name1">
+        <dgm:if name="Name2" axis="ch" ptType="node" func="cnt" op="gte" val="1">
+          <dgm:layoutNode name="childText" styleLbl="revTx">
+            <dgm:varLst>
+              <dgm:bulletEnabled val="1"/>
+            </dgm:varLst>
+            <dgm:alg type="tx">
+              <dgm:param type="stBulletLvl" val="1"/>
+              <dgm:param type="lnSpAfChP" val="20"/>
+            </dgm:alg>
+            <dgm:shape xmlns:r="http://schemas.openxmlformats.org/officeDocument/2006/relationships" type="rect" r:blip="">
+              <dgm:adjLst/>
+            </dgm:shape>
+            <dgm:presOf axis="des" ptType="node"/>
+            <dgm:constrLst>
+              <dgm:constr type="tMarg" refType="primFontSz" fact="0.1"/>
+              <dgm:constr type="bMarg" refType="primFontSz" fact="0.1"/>
+              <dgm:constr type="lMarg" refType="w" fact="0.09"/>
+            </dgm:constrLst>
+            <dgm:ruleLst>
+              <dgm:rule type="h" val="INF" fact="NaN" max="NaN"/>
+            </dgm:ruleLst>
+          </dgm:layoutNode>
+        </dgm:if>
+        <dgm:else name="Name3">
+          <dgm:choose name="Name4">
+            <dgm:if name="Name5" axis="par ch" ptType="doc node" func="cnt" op="gte" val="2">
+              <dgm:forEach name="Name6" axis="followSib" ptType="sibTrans" cnt="1">
+                <dgm:layoutNode name="spacer">
+                  <dgm:alg type="sp"/>
+                  <dgm:shape xmlns:r="http://schemas.openxmlformats.org/officeDocument/2006/relationships" r:blip="">
+                    <dgm:adjLst/>
+                  </dgm:shape>
+                  <dgm:presOf/>
+                  <dgm:constrLst/>
+                  <dgm:ruleLst/>
+                </dgm:layoutNode>
+              </dgm:forEach>
+            </dgm:if>
+            <dgm:else name="Name7"/>
+          </dgm:choose>
+        </dgm:else>
+      </dgm:choose>
+    </dgm:forEach>
+  </dgm:layoutNode>
+</dgm:layoutDef>
+</file>
+
+<file path=ppt/diagrams/quickStyle1.xml><?xml version="1.0" encoding="utf-8"?>
+<dgm:styleDef xmlns:dgm="http://schemas.openxmlformats.org/drawingml/2006/diagram" xmlns:a="http://schemas.openxmlformats.org/drawingml/2006/main" uniqueId="urn:microsoft.com/office/officeart/2005/8/quickstyle/simple1">
+  <dgm:title val=""/>
+  <dgm:desc val=""/>
+  <dgm:catLst>
+    <dgm:cat type="simple" pri="10100"/>
+  </dgm:catLst>
+  <dgm:scene3d>
+    <a:camera prst="orthographicFront"/>
+    <a:lightRig rig="threePt" dir="t"/>
+  </dgm:scene3d>
+  <dgm:styleLbl name="node0">
+    <dgm:scene3d>
+      <a:camera prst="orthographicFront"/>
+      <a:lightRig rig="threePt" dir="t"/>
+    </dgm:scene3d>
+    <dgm:sp3d/>
+    <dgm:txPr/>
+    <dgm:style>
+      <a:lnRef idx="2">
+        <a:scrgbClr r="0" g="0" b="0"/>
+      </a:lnRef>
+      <a:fillRef idx="1">
+        <a:scrgbClr r="0" g="0" b="0"/>
+      </a:fillRef>
+      <a:effectRef idx="0">
+        <a:scrgbClr r="0" g="0" b="0"/>
+      </a:effectRef>
+      <a:fontRef idx="minor">
+        <a:schemeClr val="lt1"/>
+      </a:fontRef>
+    </dgm:style>
+  </dgm:styleLbl>
+  <dgm:styleLbl name="lnNode1">
+    <dgm:scene3d>
+      <a:camera prst="orthographicFront"/>
+      <a:lightRig rig="threePt" dir="t"/>
+    </dgm:scene3d>
+    <dgm:sp3d/>
+    <dgm:txPr/>
+    <dgm:style>
+      <a:lnRef idx="2">
+        <a:scrgbClr r="0" g="0" b="0"/>
+      </a:lnRef>
+      <a:fillRef idx="1">
+        <a:scrgbClr r="0" g="0" b="0"/>
+      </a:fillRef>
+      <a:effectRef idx="0">
+        <a:scrgbClr r="0" g="0" b="0"/>
+      </a:effectRef>
+      <a:fontRef idx="minor">
+        <a:schemeClr val="lt1"/>
+      </a:fontRef>
+    </dgm:style>
+  </dgm:styleLbl>
+  <dgm:styleLbl name="vennNode1">
+    <dgm:scene3d>
+      <a:camera prst="orthographicFront"/>
+      <a:lightRig rig="threePt" dir="t"/>
+    </dgm:scene3d>
+    <dgm:sp3d/>
+    <dgm:txPr/>
+    <dgm:style>
+      <a:lnRef idx="2">
+        <a:scrgbClr r="0" g="0" b="0"/>
+      </a:lnRef>
+      <a:fillRef idx="1">
+        <a:scrgbClr r="0" g="0" b="0"/>
+      </a:fillRef>
+      <a:effectRef idx="0">
+        <a:scrgbClr r="0" g="0" b="0"/>
+      </a:effectRef>
+      <a:fontRef idx="minor">
+        <a:schemeClr val="tx1"/>
+      </a:fontRef>
+    </dgm:style>
+  </dgm:styleLbl>
+  <dgm:styleLbl name="alignNode1">
+    <dgm:scene3d>
+      <a:camera prst="orthographicFront"/>
+      <a:lightRig rig="threePt" dir="t"/>
+    </dgm:scene3d>
+    <dgm:sp3d/>
+    <dgm:txPr/>
+    <dgm:style>
+      <a:lnRef idx="2">
+        <a:scrgbClr r="0" g="0" b="0"/>
+      </a:lnRef>
+      <a:fillRef idx="1">
+        <a:scrgbClr r="0" g="0" b="0"/>
+      </a:fillRef>
+      <a:effectRef idx="0">
+        <a:scrgbClr r="0" g="0" b="0"/>
+      </a:effectRef>
+      <a:fontRef idx="minor">
+        <a:schemeClr val="lt1"/>
+      </a:fontRef>
+    </dgm:style>
+  </dgm:styleLbl>
+  <dgm:styleLbl name="node1">
+    <dgm:scene3d>
+      <a:camera prst="orthographicFront"/>
+      <a:lightRig rig="threePt" dir="t"/>
+    </dgm:scene3d>
+    <dgm:sp3d/>
+    <dgm:txPr/>
+    <dgm:style>
+      <a:lnRef idx="2">
+        <a:scrgbClr r="0" g="0" b="0"/>
+      </a:lnRef>
+      <a:fillRef idx="1">
+        <a:scrgbClr r="0" g="0" b="0"/>
+      </a:fillRef>
+      <a:effectRef idx="0">
+        <a:scrgbClr r="0" g="0" b="0"/>
+      </a:effectRef>
+      <a:fontRef idx="minor">
+        <a:schemeClr val="lt1"/>
+      </a:fontRef>
+    </dgm:style>
+  </dgm:styleLbl>
+  <dgm:styleLbl name="node2">
+    <dgm:scene3d>
+      <a:camera prst="orthographicFront"/>
+      <a:lightRig rig="threePt" dir="t"/>
+    </dgm:scene3d>
+    <dgm:sp3d/>
+    <dgm:txPr/>
+    <dgm:style>
+      <a:lnRef idx="2">
+        <a:scrgbClr r="0" g="0" b="0"/>
+      </a:lnRef>
+      <a:fillRef idx="1">
+        <a:scrgbClr r="0" g="0" b="0"/>
+      </a:fillRef>
+      <a:effectRef idx="0">
+        <a:scrgbClr r="0" g="0" b="0"/>
+      </a:effectRef>
+      <a:fontRef idx="minor">
+        <a:schemeClr val="lt1"/>
+      </a:fontRef>
+    </dgm:style>
+  </dgm:styleLbl>
+  <dgm:styleLbl name="node3">
+    <dgm:scene3d>
+      <a:camera prst="orthographicFront"/>
+      <a:lightRig rig="threePt" dir="t"/>
+    </dgm:scene3d>
+    <dgm:sp3d/>
+    <dgm:txPr/>
+    <dgm:style>
+      <a:lnRef idx="2">
+        <a:scrgbClr r="0" g="0" b="0"/>
+      </a:lnRef>
+      <a:fillRef idx="1">
+        <a:scrgbClr r="0" g="0" b="0"/>
+      </a:fillRef>
+      <a:effectRef idx="0">
+        <a:scrgbClr r="0" g="0" b="0"/>
+      </a:effectRef>
+      <a:fontRef idx="minor">
+        <a:schemeClr val="lt1"/>
+      </a:fontRef>
+    </dgm:style>
+  </dgm:styleLbl>
+  <dgm:styleLbl name="node4">
+    <dgm:scene3d>
+      <a:camera prst="orthographicFront"/>
+      <a:lightRig rig="threePt" dir="t"/>
+    </dgm:scene3d>
+    <dgm:sp3d/>
+    <dgm:txPr/>
+    <dgm:style>
+      <a:lnRef idx="2">
+        <a:scrgbClr r="0" g="0" b="0"/>
+      </a:lnRef>
+      <a:fillRef idx="1">
+        <a:scrgbClr r="0" g="0" b="0"/>
+      </a:fillRef>
+      <a:effectRef idx="0">
+        <a:scrgbClr r="0" g="0" b="0"/>
+      </a:effectRef>
+      <a:fontRef idx="minor">
+        <a:schemeClr val="lt1"/>
+      </a:fontRef>
+    </dgm:style>
+  </dgm:styleLbl>
+  <dgm:styleLbl name="fgImgPlace1">
+    <dgm:scene3d>
+      <a:camera prst="orthographicFront"/>
+      <a:lightRig rig="threePt" dir="t"/>
+    </dgm:scene3d>
+    <dgm:sp3d/>
+    <dgm:txPr/>
+    <dgm:style>
+      <a:lnRef idx="2">
+        <a:scrgbClr r="0" g="0" b="0"/>
+      </a:lnRef>
+      <a:fillRef idx="1">
+        <a:scrgbClr r="0" g="0" b="0"/>
+      </a:fillRef>
+      <a:effectRef idx="0">
+        <a:scrgbClr r="0" g="0" b="0"/>
+      </a:effectRef>
+      <a:fontRef idx="minor"/>
+    </dgm:style>
+  </dgm:styleLbl>
+  <dgm:styleLbl name="alignImgPlace1">
+    <dgm:scene3d>
+      <a:camera prst="orthographicFront"/>
+      <a:lightRig rig="threePt" dir="t"/>
+    </dgm:scene3d>
+    <dgm:sp3d/>
+    <dgm:txPr/>
+    <dgm:style>
+      <a:lnRef idx="2">
+        <a:scrgbClr r="0" g="0" b="0"/>
+      </a:lnRef>
+      <a:fillRef idx="1">
+        <a:scrgbClr r="0" g="0" b="0"/>
+      </a:fillRef>
+      <a:effectRef idx="0">
+        <a:scrgbClr r="0" g="0" b="0"/>
+      </a:effectRef>
+      <a:fontRef idx="minor"/>
+    </dgm:style>
+  </dgm:styleLbl>
+  <dgm:styleLbl name="bgImgPlace1">
+    <dgm:scene3d>
+      <a:camera prst="orthographicFront"/>
+      <a:lightRig rig="threePt" dir="t"/>
+    </dgm:scene3d>
+    <dgm:sp3d/>
+    <dgm:txPr/>
+    <dgm:style>
+      <a:lnRef idx="2">
+        <a:scrgbClr r="0" g="0" b="0"/>
+      </a:lnRef>
+      <a:fillRef idx="1">
+        <a:scrgbClr r="0" g="0" b="0"/>
+      </a:fillRef>
+      <a:effectRef idx="0">
+        <a:scrgbClr r="0" g="0" b="0"/>
+      </a:effectRef>
+      <a:fontRef idx="minor"/>
+    </dgm:style>
+  </dgm:styleLbl>
+  <dgm:styleLbl name="sibTrans2D1">
+    <dgm:scene3d>
+      <a:camera prst="orthographicFront"/>
+      <a:lightRig rig="threePt" dir="t"/>
+    </dgm:scene3d>
+    <dgm:sp3d/>
+    <dgm:txPr/>
+    <dgm:style>
+      <a:lnRef idx="0">
+        <a:scrgbClr r="0" g="0" b="0"/>
+      </a:lnRef>
+      <a:fillRef idx="1">
+        <a:scrgbClr r="0" g="0" b="0"/>
+      </a:fillRef>
+      <a:effectRef idx="0">
+        <a:scrgbClr r="0" g="0" b="0"/>
+      </a:effectRef>
+      <a:fontRef idx="minor">
+        <a:schemeClr val="lt1"/>
+      </a:fontRef>
+    </dgm:style>
+  </dgm:styleLbl>
+  <dgm:styleLbl name="fgSibTrans2D1">
+    <dgm:scene3d>
+      <a:camera prst="orthographicFront"/>
+      <a:lightRig rig="threePt" dir="t"/>
+    </dgm:scene3d>
+    <dgm:sp3d/>
+    <dgm:txPr/>
+    <dgm:style>
+      <a:lnRef idx="0">
+        <a:scrgbClr r="0" g="0" b="0"/>
+      </a:lnRef>
+      <a:fillRef idx="1">
+        <a:scrgbClr r="0" g="0" b="0"/>
+      </a:fillRef>
+      <a:effectRef idx="0">
+        <a:scrgbClr r="0" g="0" b="0"/>
+      </a:effectRef>
+      <a:fontRef idx="minor">
+        <a:schemeClr val="lt1"/>
+      </a:fontRef>
+    </dgm:style>
+  </dgm:styleLbl>
+  <dgm:styleLbl name="bgSibTrans2D1">
+    <dgm:scene3d>
+      <a:camera prst="orthographicFront"/>
+      <a:lightRig rig="threePt" dir="t"/>
+    </dgm:scene3d>
+    <dgm:sp3d/>
+    <dgm:txPr/>
+    <dgm:style>
+      <a:lnRef idx="0">
+        <a:scrgbClr r="0" g="0" b="0"/>
+      </a:lnRef>
+      <a:fillRef idx="1">
+        <a:scrgbClr r="0" g="0" b="0"/>
+      </a:fillRef>
+      <a:effectRef idx="0">
+        <a:scrgbClr r="0" g="0" b="0"/>
+      </a:effectRef>
+      <a:fontRef idx="minor">
+        <a:schemeClr val="lt1"/>
+      </a:fontRef>
+    </dgm:style>
+  </dgm:styleLbl>
+  <dgm:styleLbl name="sibTrans1D1">
+    <dgm:scene3d>
+      <a:camera prst="orthographicFront"/>
+      <a:lightRig rig="threePt" dir="t"/>
+    </dgm:scene3d>
+    <dgm:sp3d/>
+    <dgm:txPr/>
+    <dgm:style>
+      <a:lnRef idx="1">
+        <a:scrgbClr r="0" g="0" b="0"/>
+      </a:lnRef>
+      <a:fillRef idx="0">
+        <a:scrgbClr r="0" g="0" b="0"/>
+      </a:fillRef>
+      <a:effectRef idx="0">
+        <a:scrgbClr r="0" g="0" b="0"/>
+      </a:effectRef>
+      <a:fontRef idx="minor"/>
+    </dgm:style>
+  </dgm:styleLbl>
+  <dgm:styleLbl name="callout">
+    <dgm:scene3d>
+      <a:camera prst="orthographicFront"/>
+      <a:lightRig rig="threePt" dir="t"/>
+    </dgm:scene3d>
+    <dgm:sp3d/>
+    <dgm:txPr/>
+    <dgm:style>
+      <a:lnRef idx="2">
+        <a:scrgbClr r="0" g="0" b="0"/>
+      </a:lnRef>
+      <a:fillRef idx="1">
+        <a:scrgbClr r="0" g="0" b="0"/>
+      </a:fillRef>
+      <a:effectRef idx="0">
+        <a:scrgbClr r="0" g="0" b="0"/>
+      </a:effectRef>
+      <a:fontRef idx="minor"/>
+    </dgm:style>
+  </dgm:styleLbl>
+  <dgm:styleLbl name="asst0">
+    <dgm:scene3d>
+      <a:camera prst="orthographicFront"/>
+      <a:lightRig rig="threePt" dir="t"/>
+    </dgm:scene3d>
+    <dgm:sp3d/>
+    <dgm:txPr/>
+    <dgm:style>
+      <a:lnRef idx="2">
+        <a:scrgbClr r="0" g="0" b="0"/>
+      </a:lnRef>
+      <a:fillRef idx="1">
+        <a:scrgbClr r="0" g="0" b="0"/>
+      </a:fillRef>
+      <a:effectRef idx="0">
+        <a:scrgbClr r="0" g="0" b="0"/>
+      </a:effectRef>
+      <a:fontRef idx="minor">
+        <a:schemeClr val="lt1"/>
+      </a:fontRef>
+    </dgm:style>
+  </dgm:styleLbl>
+  <dgm:styleLbl name="asst1">
+    <dgm:scene3d>
+      <a:camera prst="orthographicFront"/>
+      <a:lightRig rig="threePt" dir="t"/>
+    </dgm:scene3d>
+    <dgm:sp3d/>
+    <dgm:txPr/>
+    <dgm:style>
+      <a:lnRef idx="2">
+        <a:scrgbClr r="0" g="0" b="0"/>
+      </a:lnRef>
+      <a:fillRef idx="1">
+        <a:scrgbClr r="0" g="0" b="0"/>
+      </a:fillRef>
+      <a:effectRef idx="0">
+        <a:scrgbClr r="0" g="0" b="0"/>
+      </a:effectRef>
+      <a:fontRef idx="minor">
+        <a:schemeClr val="lt1"/>
+      </a:fontRef>
+    </dgm:style>
+  </dgm:styleLbl>
+  <dgm:styleLbl name="asst2">
+    <dgm:scene3d>
+      <a:camera prst="orthographicFront"/>
+      <a:lightRig rig="threePt" dir="t"/>
+    </dgm:scene3d>
+    <dgm:sp3d/>
+    <dgm:txPr/>
+    <dgm:style>
+      <a:lnRef idx="2">
+        <a:scrgbClr r="0" g="0" b="0"/>
+      </a:lnRef>
+      <a:fillRef idx="1">
+        <a:scrgbClr r="0" g="0" b="0"/>
+      </a:fillRef>
+      <a:effectRef idx="0">
+        <a:scrgbClr r="0" g="0" b="0"/>
+      </a:effectRef>
+      <a:fontRef idx="minor">
+        <a:schemeClr val="lt1"/>
+      </a:fontRef>
+    </dgm:style>
+  </dgm:styleLbl>
+  <dgm:styleLbl name="asst3">
+    <dgm:scene3d>
+      <a:camera prst="orthographicFront"/>
+      <a:lightRig rig="threePt" dir="t"/>
+    </dgm:scene3d>
+    <dgm:sp3d/>
+    <dgm:txPr/>
+    <dgm:style>
+      <a:lnRef idx="2">
+        <a:scrgbClr r="0" g="0" b="0"/>
+      </a:lnRef>
+      <a:fillRef idx="1">
+        <a:scrgbClr r="0" g="0" b="0"/>
+      </a:fillRef>
+      <a:effectRef idx="0">
+        <a:scrgbClr r="0" g="0" b="0"/>
+      </a:effectRef>
+      <a:fontRef idx="minor">
+        <a:schemeClr val="lt1"/>
+      </a:fontRef>
+    </dgm:style>
+  </dgm:styleLbl>
+  <dgm:styleLbl name="asst4">
+    <dgm:scene3d>
+      <a:camera prst="orthographicFront"/>
+      <a:lightRig rig="threePt" dir="t"/>
+    </dgm:scene3d>
+    <dgm:sp3d/>
+    <dgm:txPr/>
+    <dgm:style>
+      <a:lnRef idx="2">
+        <a:scrgbClr r="0" g="0" b="0"/>
+      </a:lnRef>
+      <a:fillRef idx="1">
+        <a:scrgbClr r="0" g="0" b="0"/>
+      </a:fillRef>
+      <a:effectRef idx="0">
+        <a:scrgbClr r="0" g="0" b="0"/>
+      </a:effectRef>
+      <a:fontRef idx="minor">
+        <a:schemeClr val="lt1"/>
+      </a:fontRef>
+    </dgm:style>
+  </dgm:styleLbl>
+  <dgm:styleLbl name="parChTrans2D1">
+    <dgm:scene3d>
+      <a:camera prst="orthographicFront"/>
+      <a:lightRig rig="threePt" dir="t"/>
+    </dgm:scene3d>
+    <dgm:sp3d/>
+    <dgm:txPr/>
+    <dgm:style>
+      <a:lnRef idx="2">
+        <a:scrgbClr r="0" g="0" b="0"/>
+      </a:lnRef>
+      <a:fillRef idx="1">
+        <a:scrgbClr r="0" g="0" b="0"/>
+      </a:fillRef>
+      <a:effectRef idx="0">
+        <a:scrgbClr r="0" g="0" b="0"/>
+      </a:effectRef>
+      <a:fontRef idx="minor">
+        <a:schemeClr val="lt1"/>
+      </a:fontRef>
+    </dgm:style>
+  </dgm:styleLbl>
+  <dgm:styleLbl name="parChTrans2D2">
+    <dgm:scene3d>
+      <a:camera prst="orthographicFront"/>
+      <a:lightRig rig="threePt" dir="t"/>
+    </dgm:scene3d>
+    <dgm:sp3d/>
+    <dgm:txPr/>
+    <dgm:style>
+      <a:lnRef idx="2">
+        <a:scrgbClr r="0" g="0" b="0"/>
+      </a:lnRef>
+      <a:fillRef idx="1">
+        <a:scrgbClr r="0" g="0" b="0"/>
+      </a:fillRef>
+      <a:effectRef idx="0">
+        <a:scrgbClr r="0" g="0" b="0"/>
+      </a:effectRef>
+      <a:fontRef idx="minor">
+        <a:schemeClr val="lt1"/>
+      </a:fontRef>
+    </dgm:style>
+  </dgm:styleLbl>
+  <dgm:styleLbl name="parChTrans2D3">
+    <dgm:scene3d>
+      <a:camera prst="orthographicFront"/>
+      <a:lightRig rig="threePt" dir="t"/>
+    </dgm:scene3d>
+    <dgm:sp3d/>
+    <dgm:txPr/>
+    <dgm:style>
+      <a:lnRef idx="2">
+        <a:scrgbClr r="0" g="0" b="0"/>
+      </a:lnRef>
+      <a:fillRef idx="1">
+        <a:scrgbClr r="0" g="0" b="0"/>
+      </a:fillRef>
+      <a:effectRef idx="0">
+        <a:scrgbClr r="0" g="0" b="0"/>
+      </a:effectRef>
+      <a:fontRef idx="minor">
+        <a:schemeClr val="lt1"/>
+      </a:fontRef>
+    </dgm:style>
+  </dgm:styleLbl>
+  <dgm:styleLbl name="parChTrans2D4">
+    <dgm:scene3d>
+      <a:camera prst="orthographicFront"/>
+      <a:lightRig rig="threePt" dir="t"/>
+    </dgm:scene3d>
+    <dgm:sp3d/>
+    <dgm:txPr/>
+    <dgm:style>
+      <a:lnRef idx="2">
+        <a:scrgbClr r="0" g="0" b="0"/>
+      </a:lnRef>
+      <a:fillRef idx="1">
+        <a:scrgbClr r="0" g="0" b="0"/>
+      </a:fillRef>
+      <a:effectRef idx="0">
+        <a:scrgbClr r="0" g="0" b="0"/>
+      </a:effectRef>
+      <a:fontRef idx="minor">
+        <a:schemeClr val="lt1"/>
+      </a:fontRef>
+    </dgm:style>
+  </dgm:styleLbl>
+  <dgm:styleLbl name="parChTrans1D1">
+    <dgm:scene3d>
+      <a:camera prst="orthographicFront"/>
+      <a:lightRig rig="threePt" dir="t"/>
+    </dgm:scene3d>
+    <dgm:sp3d/>
+    <dgm:txPr/>
+    <dgm:style>
+      <a:lnRef idx="2">
+        <a:scrgbClr r="0" g="0" b="0"/>
+      </a:lnRef>
+      <a:fillRef idx="0">
+        <a:scrgbClr r="0" g="0" b="0"/>
+      </a:fillRef>
+      <a:effectRef idx="0">
+        <a:scrgbClr r="0" g="0" b="0"/>
+      </a:effectRef>
+      <a:fontRef idx="minor"/>
+    </dgm:style>
+  </dgm:styleLbl>
+  <dgm:styleLbl name="parChTrans1D2">
+    <dgm:scene3d>
+      <a:camera prst="orthographicFront"/>
+      <a:lightRig rig="threePt" dir="t"/>
+    </dgm:scene3d>
+    <dgm:sp3d/>
+    <dgm:txPr/>
+    <dgm:style>
+      <a:lnRef idx="2">
+        <a:scrgbClr r="0" g="0" b="0"/>
+      </a:lnRef>
+      <a:fillRef idx="0">
+        <a:scrgbClr r="0" g="0" b="0"/>
+      </a:fillRef>
+      <a:effectRef idx="0">
+        <a:scrgbClr r="0" g="0" b="0"/>
+      </a:effectRef>
+      <a:fontRef idx="minor"/>
+    </dgm:style>
+  </dgm:styleLbl>
+  <dgm:styleLbl name="parChTrans1D3">
+    <dgm:scene3d>
+      <a:camera prst="orthographicFront"/>
+      <a:lightRig rig="threePt" dir="t"/>
+    </dgm:scene3d>
+    <dgm:sp3d/>
+    <dgm:txPr/>
+    <dgm:style>
+      <a:lnRef idx="2">
+        <a:scrgbClr r="0" g="0" b="0"/>
+      </a:lnRef>
+      <a:fillRef idx="0">
+        <a:scrgbClr r="0" g="0" b="0"/>
+      </a:fillRef>
+      <a:effectRef idx="0">
+        <a:scrgbClr r="0" g="0" b="0"/>
+      </a:effectRef>
+      <a:fontRef idx="minor"/>
+    </dgm:style>
+  </dgm:styleLbl>
+  <dgm:styleLbl name="parChTrans1D4">
+    <dgm:scene3d>
+      <a:camera prst="orthographicFront"/>
+      <a:lightRig rig="threePt" dir="t"/>
+    </dgm:scene3d>
+    <dgm:sp3d/>
+    <dgm:txPr/>
+    <dgm:style>
+      <a:lnRef idx="2">
+        <a:scrgbClr r="0" g="0" b="0"/>
+      </a:lnRef>
+      <a:fillRef idx="0">
+        <a:scrgbClr r="0" g="0" b="0"/>
+      </a:fillRef>
+      <a:effectRef idx="0">
+        <a:scrgbClr r="0" g="0" b="0"/>
+      </a:effectRef>
+      <a:fontRef idx="minor"/>
+    </dgm:style>
+  </dgm:styleLbl>
+  <dgm:styleLbl name="fgAcc1">
+    <dgm:scene3d>
+      <a:camera prst="orthographicFront"/>
+      <a:lightRig rig="threePt" dir="t"/>
+    </dgm:scene3d>
+    <dgm:sp3d/>
+    <dgm:txPr/>
+    <dgm:style>
+      <a:lnRef idx="2">
+        <a:scrgbClr r="0" g="0" b="0"/>
+      </a:lnRef>
+      <a:fillRef idx="1">
+        <a:scrgbClr r="0" g="0" b="0"/>
+      </a:fillRef>
+      <a:effectRef idx="0">
+        <a:scrgbClr r="0" g="0" b="0"/>
+      </a:effectRef>
+      <a:fontRef idx="minor"/>
+    </dgm:style>
+  </dgm:styleLbl>
+  <dgm:styleLbl name="conFgAcc1">
+    <dgm:scene3d>
+      <a:camera prst="orthographicFront"/>
+      <a:lightRig rig="threePt" dir="t"/>
+    </dgm:scene3d>
+    <dgm:sp3d/>
+    <dgm:txPr/>
+    <dgm:style>
+      <a:lnRef idx="2">
+        <a:scrgbClr r="0" g="0" b="0"/>
+      </a:lnRef>
+      <a:fillRef idx="1">
+        <a:scrgbClr r="0" g="0" b="0"/>
+      </a:fillRef>
+      <a:effectRef idx="0">
+        <a:scrgbClr r="0" g="0" b="0"/>
+      </a:effectRef>
+      <a:fontRef idx="minor"/>
+    </dgm:style>
+  </dgm:styleLbl>
+  <dgm:styleLbl name="alignAcc1">
+    <dgm:scene3d>
+      <a:camera prst="orthographicFront"/>
+      <a:lightRig rig="threePt" dir="t"/>
+    </dgm:scene3d>
+    <dgm:sp3d/>
+    <dgm:txPr/>
+    <dgm:style>
+      <a:lnRef idx="2">
+        <a:scrgbClr r="0" g="0" b="0"/>
+      </a:lnRef>
+      <a:fillRef idx="1">
+        <a:scrgbClr r="0" g="0" b="0"/>
+      </a:fillRef>
+      <a:effectRef idx="0">
+        <a:scrgbClr r="0" g="0" b="0"/>
+      </a:effectRef>
+      <a:fontRef idx="minor"/>
+    </dgm:style>
+  </dgm:styleLbl>
+  <dgm:styleLbl name="trAlignAcc1">
+    <dgm:scene3d>
+      <a:camera prst="orthographicFront"/>
+      <a:lightRig rig="threePt" dir="t"/>
+    </dgm:scene3d>
+    <dgm:sp3d/>
+    <dgm:txPr/>
+    <dgm:style>
+      <a:lnRef idx="1">
+        <a:scrgbClr r="0" g="0" b="0"/>
+      </a:lnRef>
+      <a:fillRef idx="1">
+        <a:scrgbClr r="0" g="0" b="0"/>
+      </a:fillRef>
+      <a:effectRef idx="0">
+        <a:scrgbClr r="0" g="0" b="0"/>
+      </a:effectRef>
+      <a:fontRef idx="minor"/>
+    </dgm:style>
+  </dgm:styleLbl>
+  <dgm:styleLbl name="bgAcc1">
+    <dgm:scene3d>
+      <a:camera prst="orthographicFront"/>
+      <a:lightRig rig="threePt" dir="t"/>
+    </dgm:scene3d>
+    <dgm:sp3d/>
+    <dgm:txPr/>
+    <dgm:style>
+      <a:lnRef idx="2">
+        <a:scrgbClr r="0" g="0" b="0"/>
+      </a:lnRef>
+      <a:fillRef idx="1">
+        <a:scrgbClr r="0" g="0" b="0"/>
+      </a:fillRef>
+      <a:effectRef idx="0">
+        <a:scrgbClr r="0" g="0" b="0"/>
+      </a:effectRef>
+      <a:fontRef idx="minor"/>
+    </dgm:style>
+  </dgm:styleLbl>
+  <dgm:styleLbl name="solidFgAcc1">
+    <dgm:scene3d>
+      <a:camera prst="orthographicFront"/>
+      <a:lightRig rig="threePt" dir="t"/>
+    </dgm:scene3d>
+    <dgm:sp3d/>
+    <dgm:txPr/>
+    <dgm:style>
+      <a:lnRef idx="2">
+        <a:scrgbClr r="0" g="0" b="0"/>
+      </a:lnRef>
+      <a:fillRef idx="1">
+        <a:scrgbClr r="0" g="0" b="0"/>
+      </a:fillRef>
+      <a:effectRef idx="0">
+        <a:scrgbClr r="0" g="0" b="0"/>
+      </a:effectRef>
+      <a:fontRef idx="minor"/>
+    </dgm:style>
+  </dgm:styleLbl>
+  <dgm:styleLbl name="solidAlignAcc1">
+    <dgm:scene3d>
+      <a:camera prst="orthographicFront"/>
+      <a:lightRig rig="threePt" dir="t"/>
+    </dgm:scene3d>
+    <dgm:sp3d/>
+    <dgm:txPr/>
+    <dgm:style>
+      <a:lnRef idx="2">
+        <a:scrgbClr r="0" g="0" b="0"/>
+      </a:lnRef>
+      <a:fillRef idx="1">
+        <a:scrgbClr r="0" g="0" b="0"/>
+      </a:fillRef>
+      <a:effectRef idx="0">
+        <a:scrgbClr r="0" g="0" b="0"/>
+      </a:effectRef>
+      <a:fontRef idx="minor"/>
+    </dgm:style>
+  </dgm:styleLbl>
+  <dgm:styleLbl name="solidBgAcc1">
+    <dgm:scene3d>
+      <a:camera prst="orthographicFront"/>
+      <a:lightRig rig="threePt" dir="t"/>
+    </dgm:scene3d>
+    <dgm:sp3d/>
+    <dgm:txPr/>
+    <dgm:style>
+      <a:lnRef idx="2">
+        <a:scrgbClr r="0" g="0" b="0"/>
+      </a:lnRef>
+      <a:fillRef idx="1">
+        <a:scrgbClr r="0" g="0" b="0"/>
+      </a:fillRef>
+      <a:effectRef idx="0">
+        <a:scrgbClr r="0" g="0" b="0"/>
+      </a:effectRef>
+      <a:fontRef idx="minor"/>
+    </dgm:style>
+  </dgm:styleLbl>
+  <dgm:styleLbl name="fgAccFollowNode1">
+    <dgm:scene3d>
+      <a:camera prst="orthographicFront"/>
+      <a:lightRig rig="threePt" dir="t"/>
+    </dgm:scene3d>
+    <dgm:sp3d/>
+    <dgm:txPr/>
+    <dgm:style>
+      <a:lnRef idx="2">
+        <a:scrgbClr r="0" g="0" b="0"/>
+      </a:lnRef>
+      <a:fillRef idx="1">
+        <a:scrgbClr r="0" g="0" b="0"/>
+      </a:fillRef>
+      <a:effectRef idx="0">
+        <a:scrgbClr r="0" g="0" b="0"/>
+      </a:effectRef>
+      <a:fontRef idx="minor"/>
+    </dgm:style>
+  </dgm:styleLbl>
+  <dgm:styleLbl name="alignAccFollowNode1">
+    <dgm:scene3d>
+      <a:camera prst="orthographicFront"/>
+      <a:lightRig rig="threePt" dir="t"/>
+    </dgm:scene3d>
+    <dgm:sp3d/>
+    <dgm:txPr/>
+    <dgm:style>
+      <a:lnRef idx="2">
+        <a:scrgbClr r="0" g="0" b="0"/>
+      </a:lnRef>
+      <a:fillRef idx="1">
+        <a:scrgbClr r="0" g="0" b="0"/>
+      </a:fillRef>
+      <a:effectRef idx="0">
+        <a:scrgbClr r="0" g="0" b="0"/>
+      </a:effectRef>
+      <a:fontRef idx="minor"/>
+    </dgm:style>
+  </dgm:styleLbl>
+  <dgm:styleLbl name="bgAccFollowNode1">
+    <dgm:scene3d>
+      <a:camera prst="orthographicFront"/>
+      <a:lightRig rig="threePt" dir="t"/>
+    </dgm:scene3d>
+    <dgm:sp3d/>
+    <dgm:txPr/>
+    <dgm:style>
+      <a:lnRef idx="2">
+        <a:scrgbClr r="0" g="0" b="0"/>
+      </a:lnRef>
+      <a:fillRef idx="1">
+        <a:scrgbClr r="0" g="0" b="0"/>
+      </a:fillRef>
+      <a:effectRef idx="0">
+        <a:scrgbClr r="0" g="0" b="0"/>
+      </a:effectRef>
+      <a:fontRef idx="minor"/>
+    </dgm:style>
+  </dgm:styleLbl>
+  <dgm:styleLbl name="fgAcc0">
+    <dgm:scene3d>
+      <a:camera prst="orthographicFront"/>
+      <a:lightRig rig="threePt" dir="t"/>
+    </dgm:scene3d>
+    <dgm:sp3d/>
+    <dgm:txPr/>
+    <dgm:style>
+      <a:lnRef idx="2">
+        <a:scrgbClr r="0" g="0" b="0"/>
+      </a:lnRef>
+      <a:fillRef idx="1">
+        <a:scrgbClr r="0" g="0" b="0"/>
+      </a:fillRef>
+      <a:effectRef idx="0">
+        <a:scrgbClr r="0" g="0" b="0"/>
+      </a:effectRef>
+      <a:fontRef idx="minor"/>
+    </dgm:style>
+  </dgm:styleLbl>
+  <dgm:styleLbl name="fgAcc2">
+    <dgm:scene3d>
+      <a:camera prst="orthographicFront"/>
+      <a:lightRig rig="threePt" dir="t"/>
+    </dgm:scene3d>
+    <dgm:sp3d/>
+    <dgm:txPr/>
+    <dgm:style>
+      <a:lnRef idx="2">
+        <a:scrgbClr r="0" g="0" b="0"/>
+      </a:lnRef>
+      <a:fillRef idx="1">
+        <a:scrgbClr r="0" g="0" b="0"/>
+      </a:fillRef>
+      <a:effectRef idx="0">
+        <a:scrgbClr r="0" g="0" b="0"/>
+      </a:effectRef>
+      <a:fontRef idx="minor"/>
+    </dgm:style>
+  </dgm:styleLbl>
+  <dgm:styleLbl name="fgAcc3">
+    <dgm:scene3d>
+      <a:camera prst="orthographicFront"/>
+      <a:lightRig rig="threePt" dir="t"/>
+    </dgm:scene3d>
+    <dgm:sp3d/>
+    <dgm:txPr/>
+    <dgm:style>
+      <a:lnRef idx="2">
+        <a:scrgbClr r="0" g="0" b="0"/>
+      </a:lnRef>
+      <a:fillRef idx="1">
+        <a:scrgbClr r="0" g="0" b="0"/>
+      </a:fillRef>
+      <a:effectRef idx="0">
+        <a:scrgbClr r="0" g="0" b="0"/>
+      </a:effectRef>
+      <a:fontRef idx="minor"/>
+    </dgm:style>
+  </dgm:styleLbl>
+  <dgm:styleLbl name="fgAcc4">
+    <dgm:scene3d>
+      <a:camera prst="orthographicFront"/>
+      <a:lightRig rig="threePt" dir="t"/>
+    </dgm:scene3d>
+    <dgm:sp3d/>
+    <dgm:txPr/>
+    <dgm:style>
+      <a:lnRef idx="2">
+        <a:scrgbClr r="0" g="0" b="0"/>
+      </a:lnRef>
+      <a:fillRef idx="1">
+        <a:scrgbClr r="0" g="0" b="0"/>
+      </a:fillRef>
+      <a:effectRef idx="0">
+        <a:scrgbClr r="0" g="0" b="0"/>
+      </a:effectRef>
+      <a:fontRef idx="minor"/>
+    </dgm:style>
+  </dgm:styleLbl>
+  <dgm:styleLbl name="bgShp">
+    <dgm:scene3d>
+      <a:camera prst="orthographicFront"/>
+      <a:lightRig rig="threePt" dir="t"/>
+    </dgm:scene3d>
+    <dgm:sp3d/>
+    <dgm:txPr/>
+    <dgm:style>
+      <a:lnRef idx="0">
+        <a:scrgbClr r="0" g="0" b="0"/>
+      </a:lnRef>
+      <a:fillRef idx="1">
+        <a:scrgbClr r="0" g="0" b="0"/>
+      </a:fillRef>
+      <a:effectRef idx="0">
+        <a:scrgbClr r="0" g="0" b="0"/>
+      </a:effectRef>
+      <a:fontRef idx="minor"/>
+    </dgm:style>
+  </dgm:styleLbl>
+  <dgm:styleLbl name="dkBgShp">
+    <dgm:scene3d>
+      <a:camera prst="orthographicFront"/>
+      <a:lightRig rig="threePt" dir="t"/>
+    </dgm:scene3d>
+    <dgm:sp3d/>
+    <dgm:txPr/>
+    <dgm:style>
+      <a:lnRef idx="0">
+        <a:scrgbClr r="0" g="0" b="0"/>
+      </a:lnRef>
+      <a:fillRef idx="1">
+        <a:scrgbClr r="0" g="0" b="0"/>
+      </a:fillRef>
+      <a:effectRef idx="0">
+        <a:scrgbClr r="0" g="0" b="0"/>
+      </a:effectRef>
+      <a:fontRef idx="minor"/>
+    </dgm:style>
+  </dgm:styleLbl>
+  <dgm:styleLbl name="trBgShp">
+    <dgm:scene3d>
+      <a:camera prst="orthographicFront"/>
+      <a:lightRig rig="threePt" dir="t"/>
+    </dgm:scene3d>
+    <dgm:sp3d/>
+    <dgm:txPr/>
+    <dgm:style>
+      <a:lnRef idx="0">
+        <a:scrgbClr r="0" g="0" b="0"/>
+      </a:lnRef>
+      <a:fillRef idx="1">
+        <a:scrgbClr r="0" g="0" b="0"/>
+      </a:fillRef>
+      <a:effectRef idx="0">
+        <a:scrgbClr r="0" g="0" b="0"/>
+      </a:effectRef>
+      <a:fontRef idx="minor"/>
+    </dgm:style>
+  </dgm:styleLbl>
+  <dgm:styleLbl name="fgShp">
+    <dgm:scene3d>
+      <a:camera prst="orthographicFront"/>
+      <a:lightRig rig="threePt" dir="t"/>
+    </dgm:scene3d>
+    <dgm:sp3d/>
+    <dgm:txPr/>
+    <dgm:style>
+      <a:lnRef idx="2">
+        <a:scrgbClr r="0" g="0" b="0"/>
+      </a:lnRef>
+      <a:fillRef idx="1">
+        <a:scrgbClr r="0" g="0" b="0"/>
+      </a:fillRef>
+      <a:effectRef idx="0">
+        <a:scrgbClr r="0" g="0" b="0"/>
+      </a:effectRef>
+      <a:fontRef idx="minor"/>
+    </dgm:style>
+  </dgm:styleLbl>
+  <dgm:styleLbl name="revTx">
+    <dgm:scene3d>
+      <a:camera prst="orthographicFront"/>
+      <a:lightRig rig="threePt" dir="t"/>
+    </dgm:scene3d>
+    <dgm:sp3d/>
+    <dgm:txPr/>
+    <dgm:style>
+      <a:lnRef idx="0">
+        <a:scrgbClr r="0" g="0" b="0"/>
+      </a:lnRef>
+      <a:fillRef idx="0">
+        <a:scrgbClr r="0" g="0" b="0"/>
+      </a:fillRef>
+      <a:effectRef idx="0">
+        <a:scrgbClr r="0" g="0" b="0"/>
+      </a:effectRef>
+      <a:fontRef idx="minor"/>
+    </dgm:style>
+  </dgm:styleLbl>
+</dgm:styleDef>
 </file>
 
 <file path=ppt/slideLayouts/slideLayout1.xml><?xml version="1.0" encoding="utf-8"?>
@@ -260,7 +2817,7 @@
           <a:p>
             <a:fld id="{F9B2CC6A-C0EB-44C5-9F68-F2370A8208E7}" type="datetimeFigureOut">
               <a:rPr lang="en-US" smtClean="0"/>
-              <a:t>10/6/2019</a:t>
+              <a:t>10/7/2019</a:t>
             </a:fld>
             <a:endParaRPr lang="en-US"/>
           </a:p>
@@ -458,7 +3015,7 @@
           <a:p>
             <a:fld id="{F9B2CC6A-C0EB-44C5-9F68-F2370A8208E7}" type="datetimeFigureOut">
               <a:rPr lang="en-US" smtClean="0"/>
-              <a:t>10/6/2019</a:t>
+              <a:t>10/7/2019</a:t>
             </a:fld>
             <a:endParaRPr lang="en-US"/>
           </a:p>
@@ -666,7 +3223,7 @@
           <a:p>
             <a:fld id="{F9B2CC6A-C0EB-44C5-9F68-F2370A8208E7}" type="datetimeFigureOut">
               <a:rPr lang="en-US" smtClean="0"/>
-              <a:t>10/6/2019</a:t>
+              <a:t>10/7/2019</a:t>
             </a:fld>
             <a:endParaRPr lang="en-US"/>
           </a:p>
@@ -864,7 +3421,7 @@
           <a:p>
             <a:fld id="{F9B2CC6A-C0EB-44C5-9F68-F2370A8208E7}" type="datetimeFigureOut">
               <a:rPr lang="en-US" smtClean="0"/>
-              <a:t>10/6/2019</a:t>
+              <a:t>10/7/2019</a:t>
             </a:fld>
             <a:endParaRPr lang="en-US"/>
           </a:p>
@@ -1139,7 +3696,7 @@
           <a:p>
             <a:fld id="{F9B2CC6A-C0EB-44C5-9F68-F2370A8208E7}" type="datetimeFigureOut">
               <a:rPr lang="en-US" smtClean="0"/>
-              <a:t>10/6/2019</a:t>
+              <a:t>10/7/2019</a:t>
             </a:fld>
             <a:endParaRPr lang="en-US"/>
           </a:p>
@@ -1404,7 +3961,7 @@
           <a:p>
             <a:fld id="{F9B2CC6A-C0EB-44C5-9F68-F2370A8208E7}" type="datetimeFigureOut">
               <a:rPr lang="en-US" smtClean="0"/>
-              <a:t>10/6/2019</a:t>
+              <a:t>10/7/2019</a:t>
             </a:fld>
             <a:endParaRPr lang="en-US"/>
           </a:p>
@@ -1816,7 +4373,7 @@
           <a:p>
             <a:fld id="{F9B2CC6A-C0EB-44C5-9F68-F2370A8208E7}" type="datetimeFigureOut">
               <a:rPr lang="en-US" smtClean="0"/>
-              <a:t>10/6/2019</a:t>
+              <a:t>10/7/2019</a:t>
             </a:fld>
             <a:endParaRPr lang="en-US"/>
           </a:p>
@@ -1957,7 +4514,7 @@
           <a:p>
             <a:fld id="{F9B2CC6A-C0EB-44C5-9F68-F2370A8208E7}" type="datetimeFigureOut">
               <a:rPr lang="en-US" smtClean="0"/>
-              <a:t>10/6/2019</a:t>
+              <a:t>10/7/2019</a:t>
             </a:fld>
             <a:endParaRPr lang="en-US"/>
           </a:p>
@@ -2070,7 +4627,7 @@
           <a:p>
             <a:fld id="{F9B2CC6A-C0EB-44C5-9F68-F2370A8208E7}" type="datetimeFigureOut">
               <a:rPr lang="en-US" smtClean="0"/>
-              <a:t>10/6/2019</a:t>
+              <a:t>10/7/2019</a:t>
             </a:fld>
             <a:endParaRPr lang="en-US"/>
           </a:p>
@@ -2381,7 +4938,7 @@
           <a:p>
             <a:fld id="{F9B2CC6A-C0EB-44C5-9F68-F2370A8208E7}" type="datetimeFigureOut">
               <a:rPr lang="en-US" smtClean="0"/>
-              <a:t>10/6/2019</a:t>
+              <a:t>10/7/2019</a:t>
             </a:fld>
             <a:endParaRPr lang="en-US"/>
           </a:p>
@@ -2669,7 +5226,7 @@
           <a:p>
             <a:fld id="{F9B2CC6A-C0EB-44C5-9F68-F2370A8208E7}" type="datetimeFigureOut">
               <a:rPr lang="en-US" smtClean="0"/>
-              <a:t>10/6/2019</a:t>
+              <a:t>10/7/2019</a:t>
             </a:fld>
             <a:endParaRPr lang="en-US"/>
           </a:p>
@@ -2910,7 +5467,7 @@
           <a:p>
             <a:fld id="{F9B2CC6A-C0EB-44C5-9F68-F2370A8208E7}" type="datetimeFigureOut">
               <a:rPr lang="en-US" smtClean="0"/>
-              <a:t>10/6/2019</a:t>
+              <a:t>10/7/2019</a:t>
             </a:fld>
             <a:endParaRPr lang="en-US"/>
           </a:p>
@@ -4007,7 +6564,7 @@
         <p:spPr>
           <a:xfrm>
             <a:off x="7208880" y="0"/>
-            <a:ext cx="3264195" cy="6740307"/>
+            <a:ext cx="3264195" cy="7232749"/>
           </a:xfrm>
           <a:prstGeom prst="rect">
             <a:avLst/>
@@ -4061,7 +6618,7 @@
             </a:pPr>
             <a:r>
               <a:rPr lang="en-US" sz="2400" dirty="0"/>
-              <a:t>Front-End Design</a:t>
+              <a:t>Front-End</a:t>
             </a:r>
           </a:p>
           <a:p>
@@ -4123,7 +6680,7 @@
             </a:pPr>
             <a:r>
               <a:rPr lang="en-US" sz="2400" dirty="0"/>
-              <a:t>Back-End</a:t>
+              <a:t>API</a:t>
             </a:r>
           </a:p>
           <a:p>
@@ -4135,6 +6692,23 @@
               <a:rPr lang="en-US" sz="2400" dirty="0"/>
               <a:t>Database</a:t>
             </a:r>
+          </a:p>
+          <a:p>
+            <a:pPr marL="342900" indent="-342900">
+              <a:buFont typeface="Arial" panose="020B0604020202020204" pitchFamily="34" charset="0"/>
+              <a:buChar char="•"/>
+            </a:pPr>
+            <a:r>
+              <a:rPr lang="en-US" sz="2400" dirty="0"/>
+              <a:t>Server Deployment</a:t>
+            </a:r>
+          </a:p>
+          <a:p>
+            <a:pPr marL="342900" indent="-342900">
+              <a:buFont typeface="Arial" panose="020B0604020202020204" pitchFamily="34" charset="0"/>
+              <a:buChar char="•"/>
+            </a:pPr>
+            <a:endParaRPr lang="en-US" sz="2400" dirty="0"/>
           </a:p>
         </p:txBody>
       </p:sp>
@@ -4152,6 +6726,595 @@
 </file>
 
 <file path=ppt/slides/slide4.xml><?xml version="1.0" encoding="utf-8"?>
+<p:sld xmlns:a="http://schemas.openxmlformats.org/drawingml/2006/main" xmlns:r="http://schemas.openxmlformats.org/officeDocument/2006/relationships" xmlns:p="http://schemas.openxmlformats.org/presentationml/2006/main">
+  <p:cSld>
+    <p:bg>
+      <p:bgPr>
+        <a:solidFill>
+          <a:schemeClr val="bg1"/>
+        </a:solidFill>
+        <a:effectLst/>
+      </p:bgPr>
+    </p:bg>
+    <p:spTree>
+      <p:nvGrpSpPr>
+        <p:cNvPr id="1" name=""/>
+        <p:cNvGrpSpPr/>
+        <p:nvPr/>
+      </p:nvGrpSpPr>
+      <p:grpSpPr>
+        <a:xfrm>
+          <a:off x="0" y="0"/>
+          <a:ext cx="0" cy="0"/>
+          <a:chOff x="0" y="0"/>
+          <a:chExt cx="0" cy="0"/>
+        </a:xfrm>
+      </p:grpSpPr>
+      <p:sp>
+        <p:nvSpPr>
+          <p:cNvPr id="10" name="Freeform: Shape 9">
+            <a:extLst>
+              <a:ext uri="{FF2B5EF4-FFF2-40B4-BE49-F238E27FC236}">
+                <a16:creationId xmlns:a16="http://schemas.microsoft.com/office/drawing/2014/main" id="{46C2E80F-49A6-4372-B103-219D417A55ED}"/>
+              </a:ext>
+              <a:ext uri="{C183D7F6-B498-43B3-948B-1728B52AA6E4}">
+                <adec:decorative xmlns:adec="http://schemas.microsoft.com/office/drawing/2017/decorative" val="1"/>
+              </a:ext>
+            </a:extLst>
+          </p:cNvPr>
+          <p:cNvSpPr>
+            <a:spLocks noGrp="1" noRot="1" noChangeAspect="1" noMove="1" noResize="1" noEditPoints="1" noAdjustHandles="1" noChangeArrowheads="1" noChangeShapeType="1" noTextEdit="1"/>
+          </p:cNvSpPr>
+          <p:nvPr>
+            <p:extLst>
+              <p:ext uri="{386F3935-93C4-4BCD-93E2-E3B085C9AB24}">
+                <p16:designElem xmlns:p16="http://schemas.microsoft.com/office/powerpoint/2015/main" val="1"/>
+              </p:ext>
+            </p:extLst>
+          </p:nvPr>
+        </p:nvSpPr>
+        <p:spPr>
+          <a:xfrm>
+            <a:off x="484096" y="470925"/>
+            <a:ext cx="4381009" cy="5892104"/>
+          </a:xfrm>
+          <a:custGeom>
+            <a:avLst/>
+            <a:gdLst>
+              <a:gd name="connsiteX0" fmla="*/ 0 w 4381009"/>
+              <a:gd name="connsiteY0" fmla="*/ 0 h 5892104"/>
+              <a:gd name="connsiteX1" fmla="*/ 4157628 w 4381009"/>
+              <a:gd name="connsiteY1" fmla="*/ 0 h 5892104"/>
+              <a:gd name="connsiteX2" fmla="*/ 4169302 w 4381009"/>
+              <a:gd name="connsiteY2" fmla="*/ 68659 h 5892104"/>
+              <a:gd name="connsiteX3" fmla="*/ 4191571 w 4381009"/>
+              <a:gd name="connsiteY3" fmla="*/ 205472 h 5892104"/>
+              <a:gd name="connsiteX4" fmla="*/ 4213368 w 4381009"/>
+              <a:gd name="connsiteY4" fmla="*/ 342890 h 5892104"/>
+              <a:gd name="connsiteX5" fmla="*/ 4232030 w 4381009"/>
+              <a:gd name="connsiteY5" fmla="*/ 480913 h 5892104"/>
+              <a:gd name="connsiteX6" fmla="*/ 4250848 w 4381009"/>
+              <a:gd name="connsiteY6" fmla="*/ 618332 h 5892104"/>
+              <a:gd name="connsiteX7" fmla="*/ 4268412 w 4381009"/>
+              <a:gd name="connsiteY7" fmla="*/ 756355 h 5892104"/>
+              <a:gd name="connsiteX8" fmla="*/ 4283467 w 4381009"/>
+              <a:gd name="connsiteY8" fmla="*/ 892563 h 5892104"/>
+              <a:gd name="connsiteX9" fmla="*/ 4297737 w 4381009"/>
+              <a:gd name="connsiteY9" fmla="*/ 1030587 h 5892104"/>
+              <a:gd name="connsiteX10" fmla="*/ 4310754 w 4381009"/>
+              <a:gd name="connsiteY10" fmla="*/ 1168005 h 5892104"/>
+              <a:gd name="connsiteX11" fmla="*/ 4322045 w 4381009"/>
+              <a:gd name="connsiteY11" fmla="*/ 1303002 h 5892104"/>
+              <a:gd name="connsiteX12" fmla="*/ 4333336 w 4381009"/>
+              <a:gd name="connsiteY12" fmla="*/ 1439815 h 5892104"/>
+              <a:gd name="connsiteX13" fmla="*/ 4342745 w 4381009"/>
+              <a:gd name="connsiteY13" fmla="*/ 1574812 h 5892104"/>
+              <a:gd name="connsiteX14" fmla="*/ 4350115 w 4381009"/>
+              <a:gd name="connsiteY14" fmla="*/ 1709808 h 5892104"/>
+              <a:gd name="connsiteX15" fmla="*/ 4357799 w 4381009"/>
+              <a:gd name="connsiteY15" fmla="*/ 1844200 h 5892104"/>
+              <a:gd name="connsiteX16" fmla="*/ 4364229 w 4381009"/>
+              <a:gd name="connsiteY16" fmla="*/ 1977381 h 5892104"/>
+              <a:gd name="connsiteX17" fmla="*/ 4368777 w 4381009"/>
+              <a:gd name="connsiteY17" fmla="*/ 2109351 h 5892104"/>
+              <a:gd name="connsiteX18" fmla="*/ 4372697 w 4381009"/>
+              <a:gd name="connsiteY18" fmla="*/ 2241321 h 5892104"/>
+              <a:gd name="connsiteX19" fmla="*/ 4376461 w 4381009"/>
+              <a:gd name="connsiteY19" fmla="*/ 2372080 h 5892104"/>
+              <a:gd name="connsiteX20" fmla="*/ 4378186 w 4381009"/>
+              <a:gd name="connsiteY20" fmla="*/ 2501023 h 5892104"/>
+              <a:gd name="connsiteX21" fmla="*/ 4380068 w 4381009"/>
+              <a:gd name="connsiteY21" fmla="*/ 2629966 h 5892104"/>
+              <a:gd name="connsiteX22" fmla="*/ 4381009 w 4381009"/>
+              <a:gd name="connsiteY22" fmla="*/ 2757093 h 5892104"/>
+              <a:gd name="connsiteX23" fmla="*/ 4380068 w 4381009"/>
+              <a:gd name="connsiteY23" fmla="*/ 2883010 h 5892104"/>
+              <a:gd name="connsiteX24" fmla="*/ 4380068 w 4381009"/>
+              <a:gd name="connsiteY24" fmla="*/ 3007715 h 5892104"/>
+              <a:gd name="connsiteX25" fmla="*/ 4378186 w 4381009"/>
+              <a:gd name="connsiteY25" fmla="*/ 3131210 h 5892104"/>
+              <a:gd name="connsiteX26" fmla="*/ 4375363 w 4381009"/>
+              <a:gd name="connsiteY26" fmla="*/ 3252283 h 5892104"/>
+              <a:gd name="connsiteX27" fmla="*/ 4372697 w 4381009"/>
+              <a:gd name="connsiteY27" fmla="*/ 3372146 h 5892104"/>
+              <a:gd name="connsiteX28" fmla="*/ 4369718 w 4381009"/>
+              <a:gd name="connsiteY28" fmla="*/ 3489587 h 5892104"/>
+              <a:gd name="connsiteX29" fmla="*/ 4365170 w 4381009"/>
+              <a:gd name="connsiteY29" fmla="*/ 3606423 h 5892104"/>
+              <a:gd name="connsiteX30" fmla="*/ 4360309 w 4381009"/>
+              <a:gd name="connsiteY30" fmla="*/ 3721443 h 5892104"/>
+              <a:gd name="connsiteX31" fmla="*/ 4355918 w 4381009"/>
+              <a:gd name="connsiteY31" fmla="*/ 3834041 h 5892104"/>
+              <a:gd name="connsiteX32" fmla="*/ 4343529 w 4381009"/>
+              <a:gd name="connsiteY32" fmla="*/ 4053789 h 5892104"/>
+              <a:gd name="connsiteX33" fmla="*/ 4330356 w 4381009"/>
+              <a:gd name="connsiteY33" fmla="*/ 4264457 h 5892104"/>
+              <a:gd name="connsiteX34" fmla="*/ 4316556 w 4381009"/>
+              <a:gd name="connsiteY34" fmla="*/ 4466650 h 5892104"/>
+              <a:gd name="connsiteX35" fmla="*/ 4301344 w 4381009"/>
+              <a:gd name="connsiteY35" fmla="*/ 4657946 h 5892104"/>
+              <a:gd name="connsiteX36" fmla="*/ 4285506 w 4381009"/>
+              <a:gd name="connsiteY36" fmla="*/ 4840767 h 5892104"/>
+              <a:gd name="connsiteX37" fmla="*/ 4268412 w 4381009"/>
+              <a:gd name="connsiteY37" fmla="*/ 5010269 h 5892104"/>
+              <a:gd name="connsiteX38" fmla="*/ 4251633 w 4381009"/>
+              <a:gd name="connsiteY38" fmla="*/ 5169481 h 5892104"/>
+              <a:gd name="connsiteX39" fmla="*/ 4234853 w 4381009"/>
+              <a:gd name="connsiteY39" fmla="*/ 5315980 h 5892104"/>
+              <a:gd name="connsiteX40" fmla="*/ 4219014 w 4381009"/>
+              <a:gd name="connsiteY40" fmla="*/ 5450371 h 5892104"/>
+              <a:gd name="connsiteX41" fmla="*/ 4203959 w 4381009"/>
+              <a:gd name="connsiteY41" fmla="*/ 5569628 h 5892104"/>
+              <a:gd name="connsiteX42" fmla="*/ 4189689 w 4381009"/>
+              <a:gd name="connsiteY42" fmla="*/ 5677384 h 5892104"/>
+              <a:gd name="connsiteX43" fmla="*/ 4177770 w 4381009"/>
+              <a:gd name="connsiteY43" fmla="*/ 5768189 h 5892104"/>
+              <a:gd name="connsiteX44" fmla="*/ 4166479 w 4381009"/>
+              <a:gd name="connsiteY44" fmla="*/ 5844465 h 5892104"/>
+              <a:gd name="connsiteX45" fmla="*/ 4159132 w 4381009"/>
+              <a:gd name="connsiteY45" fmla="*/ 5892104 h 5892104"/>
+              <a:gd name="connsiteX46" fmla="*/ 0 w 4381009"/>
+              <a:gd name="connsiteY46" fmla="*/ 5892104 h 5892104"/>
+            </a:gdLst>
+            <a:ahLst/>
+            <a:cxnLst>
+              <a:cxn ang="0">
+                <a:pos x="connsiteX0" y="connsiteY0"/>
+              </a:cxn>
+              <a:cxn ang="0">
+                <a:pos x="connsiteX1" y="connsiteY1"/>
+              </a:cxn>
+              <a:cxn ang="0">
+                <a:pos x="connsiteX2" y="connsiteY2"/>
+              </a:cxn>
+              <a:cxn ang="0">
+                <a:pos x="connsiteX3" y="connsiteY3"/>
+              </a:cxn>
+              <a:cxn ang="0">
+                <a:pos x="connsiteX4" y="connsiteY4"/>
+              </a:cxn>
+              <a:cxn ang="0">
+                <a:pos x="connsiteX5" y="connsiteY5"/>
+              </a:cxn>
+              <a:cxn ang="0">
+                <a:pos x="connsiteX6" y="connsiteY6"/>
+              </a:cxn>
+              <a:cxn ang="0">
+                <a:pos x="connsiteX7" y="connsiteY7"/>
+              </a:cxn>
+              <a:cxn ang="0">
+                <a:pos x="connsiteX8" y="connsiteY8"/>
+              </a:cxn>
+              <a:cxn ang="0">
+                <a:pos x="connsiteX9" y="connsiteY9"/>
+              </a:cxn>
+              <a:cxn ang="0">
+                <a:pos x="connsiteX10" y="connsiteY10"/>
+              </a:cxn>
+              <a:cxn ang="0">
+                <a:pos x="connsiteX11" y="connsiteY11"/>
+              </a:cxn>
+              <a:cxn ang="0">
+                <a:pos x="connsiteX12" y="connsiteY12"/>
+              </a:cxn>
+              <a:cxn ang="0">
+                <a:pos x="connsiteX13" y="connsiteY13"/>
+              </a:cxn>
+              <a:cxn ang="0">
+                <a:pos x="connsiteX14" y="connsiteY14"/>
+              </a:cxn>
+              <a:cxn ang="0">
+                <a:pos x="connsiteX15" y="connsiteY15"/>
+              </a:cxn>
+              <a:cxn ang="0">
+                <a:pos x="connsiteX16" y="connsiteY16"/>
+              </a:cxn>
+              <a:cxn ang="0">
+                <a:pos x="connsiteX17" y="connsiteY17"/>
+              </a:cxn>
+              <a:cxn ang="0">
+                <a:pos x="connsiteX18" y="connsiteY18"/>
+              </a:cxn>
+              <a:cxn ang="0">
+                <a:pos x="connsiteX19" y="connsiteY19"/>
+              </a:cxn>
+              <a:cxn ang="0">
+                <a:pos x="connsiteX20" y="connsiteY20"/>
+              </a:cxn>
+              <a:cxn ang="0">
+                <a:pos x="connsiteX21" y="connsiteY21"/>
+              </a:cxn>
+              <a:cxn ang="0">
+                <a:pos x="connsiteX22" y="connsiteY22"/>
+              </a:cxn>
+              <a:cxn ang="0">
+                <a:pos x="connsiteX23" y="connsiteY23"/>
+              </a:cxn>
+              <a:cxn ang="0">
+                <a:pos x="connsiteX24" y="connsiteY24"/>
+              </a:cxn>
+              <a:cxn ang="0">
+                <a:pos x="connsiteX25" y="connsiteY25"/>
+              </a:cxn>
+              <a:cxn ang="0">
+                <a:pos x="connsiteX26" y="connsiteY26"/>
+              </a:cxn>
+              <a:cxn ang="0">
+                <a:pos x="connsiteX27" y="connsiteY27"/>
+              </a:cxn>
+              <a:cxn ang="0">
+                <a:pos x="connsiteX28" y="connsiteY28"/>
+              </a:cxn>
+              <a:cxn ang="0">
+                <a:pos x="connsiteX29" y="connsiteY29"/>
+              </a:cxn>
+              <a:cxn ang="0">
+                <a:pos x="connsiteX30" y="connsiteY30"/>
+              </a:cxn>
+              <a:cxn ang="0">
+                <a:pos x="connsiteX31" y="connsiteY31"/>
+              </a:cxn>
+              <a:cxn ang="0">
+                <a:pos x="connsiteX32" y="connsiteY32"/>
+              </a:cxn>
+              <a:cxn ang="0">
+                <a:pos x="connsiteX33" y="connsiteY33"/>
+              </a:cxn>
+              <a:cxn ang="0">
+                <a:pos x="connsiteX34" y="connsiteY34"/>
+              </a:cxn>
+              <a:cxn ang="0">
+                <a:pos x="connsiteX35" y="connsiteY35"/>
+              </a:cxn>
+              <a:cxn ang="0">
+                <a:pos x="connsiteX36" y="connsiteY36"/>
+              </a:cxn>
+              <a:cxn ang="0">
+                <a:pos x="connsiteX37" y="connsiteY37"/>
+              </a:cxn>
+              <a:cxn ang="0">
+                <a:pos x="connsiteX38" y="connsiteY38"/>
+              </a:cxn>
+              <a:cxn ang="0">
+                <a:pos x="connsiteX39" y="connsiteY39"/>
+              </a:cxn>
+              <a:cxn ang="0">
+                <a:pos x="connsiteX40" y="connsiteY40"/>
+              </a:cxn>
+              <a:cxn ang="0">
+                <a:pos x="connsiteX41" y="connsiteY41"/>
+              </a:cxn>
+              <a:cxn ang="0">
+                <a:pos x="connsiteX42" y="connsiteY42"/>
+              </a:cxn>
+              <a:cxn ang="0">
+                <a:pos x="connsiteX43" y="connsiteY43"/>
+              </a:cxn>
+              <a:cxn ang="0">
+                <a:pos x="connsiteX44" y="connsiteY44"/>
+              </a:cxn>
+              <a:cxn ang="0">
+                <a:pos x="connsiteX45" y="connsiteY45"/>
+              </a:cxn>
+              <a:cxn ang="0">
+                <a:pos x="connsiteX46" y="connsiteY46"/>
+              </a:cxn>
+            </a:cxnLst>
+            <a:rect l="l" t="t" r="r" b="b"/>
+            <a:pathLst>
+              <a:path w="4381009" h="5892104">
+                <a:moveTo>
+                  <a:pt x="0" y="0"/>
+                </a:moveTo>
+                <a:lnTo>
+                  <a:pt x="4157628" y="0"/>
+                </a:lnTo>
+                <a:lnTo>
+                  <a:pt x="4169302" y="68659"/>
+                </a:lnTo>
+                <a:lnTo>
+                  <a:pt x="4191571" y="205472"/>
+                </a:lnTo>
+                <a:lnTo>
+                  <a:pt x="4213368" y="342890"/>
+                </a:lnTo>
+                <a:lnTo>
+                  <a:pt x="4232030" y="480913"/>
+                </a:lnTo>
+                <a:lnTo>
+                  <a:pt x="4250848" y="618332"/>
+                </a:lnTo>
+                <a:lnTo>
+                  <a:pt x="4268412" y="756355"/>
+                </a:lnTo>
+                <a:lnTo>
+                  <a:pt x="4283467" y="892563"/>
+                </a:lnTo>
+                <a:lnTo>
+                  <a:pt x="4297737" y="1030587"/>
+                </a:lnTo>
+                <a:lnTo>
+                  <a:pt x="4310754" y="1168005"/>
+                </a:lnTo>
+                <a:lnTo>
+                  <a:pt x="4322045" y="1303002"/>
+                </a:lnTo>
+                <a:lnTo>
+                  <a:pt x="4333336" y="1439815"/>
+                </a:lnTo>
+                <a:lnTo>
+                  <a:pt x="4342745" y="1574812"/>
+                </a:lnTo>
+                <a:lnTo>
+                  <a:pt x="4350115" y="1709808"/>
+                </a:lnTo>
+                <a:lnTo>
+                  <a:pt x="4357799" y="1844200"/>
+                </a:lnTo>
+                <a:lnTo>
+                  <a:pt x="4364229" y="1977381"/>
+                </a:lnTo>
+                <a:lnTo>
+                  <a:pt x="4368777" y="2109351"/>
+                </a:lnTo>
+                <a:lnTo>
+                  <a:pt x="4372697" y="2241321"/>
+                </a:lnTo>
+                <a:lnTo>
+                  <a:pt x="4376461" y="2372080"/>
+                </a:lnTo>
+                <a:lnTo>
+                  <a:pt x="4378186" y="2501023"/>
+                </a:lnTo>
+                <a:lnTo>
+                  <a:pt x="4380068" y="2629966"/>
+                </a:lnTo>
+                <a:lnTo>
+                  <a:pt x="4381009" y="2757093"/>
+                </a:lnTo>
+                <a:lnTo>
+                  <a:pt x="4380068" y="2883010"/>
+                </a:lnTo>
+                <a:lnTo>
+                  <a:pt x="4380068" y="3007715"/>
+                </a:lnTo>
+                <a:lnTo>
+                  <a:pt x="4378186" y="3131210"/>
+                </a:lnTo>
+                <a:lnTo>
+                  <a:pt x="4375363" y="3252283"/>
+                </a:lnTo>
+                <a:lnTo>
+                  <a:pt x="4372697" y="3372146"/>
+                </a:lnTo>
+                <a:lnTo>
+                  <a:pt x="4369718" y="3489587"/>
+                </a:lnTo>
+                <a:lnTo>
+                  <a:pt x="4365170" y="3606423"/>
+                </a:lnTo>
+                <a:lnTo>
+                  <a:pt x="4360309" y="3721443"/>
+                </a:lnTo>
+                <a:lnTo>
+                  <a:pt x="4355918" y="3834041"/>
+                </a:lnTo>
+                <a:lnTo>
+                  <a:pt x="4343529" y="4053789"/>
+                </a:lnTo>
+                <a:lnTo>
+                  <a:pt x="4330356" y="4264457"/>
+                </a:lnTo>
+                <a:lnTo>
+                  <a:pt x="4316556" y="4466650"/>
+                </a:lnTo>
+                <a:lnTo>
+                  <a:pt x="4301344" y="4657946"/>
+                </a:lnTo>
+                <a:lnTo>
+                  <a:pt x="4285506" y="4840767"/>
+                </a:lnTo>
+                <a:lnTo>
+                  <a:pt x="4268412" y="5010269"/>
+                </a:lnTo>
+                <a:lnTo>
+                  <a:pt x="4251633" y="5169481"/>
+                </a:lnTo>
+                <a:lnTo>
+                  <a:pt x="4234853" y="5315980"/>
+                </a:lnTo>
+                <a:lnTo>
+                  <a:pt x="4219014" y="5450371"/>
+                </a:lnTo>
+                <a:lnTo>
+                  <a:pt x="4203959" y="5569628"/>
+                </a:lnTo>
+                <a:lnTo>
+                  <a:pt x="4189689" y="5677384"/>
+                </a:lnTo>
+                <a:lnTo>
+                  <a:pt x="4177770" y="5768189"/>
+                </a:lnTo>
+                <a:lnTo>
+                  <a:pt x="4166479" y="5844465"/>
+                </a:lnTo>
+                <a:lnTo>
+                  <a:pt x="4159132" y="5892104"/>
+                </a:lnTo>
+                <a:lnTo>
+                  <a:pt x="0" y="5892104"/>
+                </a:lnTo>
+                <a:close/>
+              </a:path>
+            </a:pathLst>
+          </a:custGeom>
+          <a:solidFill>
+            <a:srgbClr val="404040"/>
+          </a:solidFill>
+          <a:ln>
+            <a:noFill/>
+          </a:ln>
+        </p:spPr>
+        <p:style>
+          <a:lnRef idx="2">
+            <a:schemeClr val="accent1">
+              <a:shade val="50000"/>
+            </a:schemeClr>
+          </a:lnRef>
+          <a:fillRef idx="1">
+            <a:schemeClr val="accent1"/>
+          </a:fillRef>
+          <a:effectRef idx="0">
+            <a:schemeClr val="accent1"/>
+          </a:effectRef>
+          <a:fontRef idx="minor">
+            <a:schemeClr val="lt1"/>
+          </a:fontRef>
+        </p:style>
+        <p:txBody>
+          <a:bodyPr wrap="square" rtlCol="0" anchor="ctr">
+            <a:noAutofit/>
+          </a:bodyPr>
+          <a:lstStyle/>
+          <a:p>
+            <a:pPr marL="0" marR="0" lvl="0" indent="0" algn="ctr" defTabSz="457200" rtl="0" eaLnBrk="1" fontAlgn="auto" latinLnBrk="0" hangingPunct="1">
+              <a:lnSpc>
+                <a:spcPct val="100000"/>
+              </a:lnSpc>
+              <a:spcBef>
+                <a:spcPts val="0"/>
+              </a:spcBef>
+              <a:spcAft>
+                <a:spcPts val="0"/>
+              </a:spcAft>
+              <a:buClrTx/>
+              <a:buSzTx/>
+              <a:buFontTx/>
+              <a:buNone/>
+              <a:tabLst/>
+              <a:defRPr/>
+            </a:pPr>
+            <a:endParaRPr kumimoji="0" lang="en-US" sz="1800" b="0" i="0" u="none" strike="noStrike" kern="1200" cap="none" spc="0" normalizeH="0" baseline="0" noProof="0">
+              <a:ln>
+                <a:noFill/>
+              </a:ln>
+              <a:solidFill>
+                <a:prstClr val="white"/>
+              </a:solidFill>
+              <a:effectLst/>
+              <a:uLnTx/>
+              <a:uFillTx/>
+              <a:latin typeface="Calibri" panose="020F0502020204030204"/>
+              <a:ea typeface="+mn-ea"/>
+              <a:cs typeface="+mn-cs"/>
+            </a:endParaRPr>
+          </a:p>
+        </p:txBody>
+      </p:sp>
+      <p:sp>
+        <p:nvSpPr>
+          <p:cNvPr id="2" name="Title 1">
+            <a:extLst>
+              <a:ext uri="{FF2B5EF4-FFF2-40B4-BE49-F238E27FC236}">
+                <a16:creationId xmlns:a16="http://schemas.microsoft.com/office/drawing/2014/main" id="{CF033685-556C-446E-A56D-2D49A8060A12}"/>
+              </a:ext>
+            </a:extLst>
+          </p:cNvPr>
+          <p:cNvSpPr>
+            <a:spLocks noGrp="1"/>
+          </p:cNvSpPr>
+          <p:nvPr>
+            <p:ph type="title"/>
+          </p:nvPr>
+        </p:nvSpPr>
+        <p:spPr>
+          <a:xfrm>
+            <a:off x="891145" y="1015933"/>
+            <a:ext cx="3566909" cy="4795408"/>
+          </a:xfrm>
+        </p:spPr>
+        <p:txBody>
+          <a:bodyPr>
+            <a:normAutofit/>
+          </a:bodyPr>
+          <a:lstStyle/>
+          <a:p>
+            <a:r>
+              <a:rPr lang="en-US" sz="5400" b="1" dirty="0">
+                <a:solidFill>
+                  <a:srgbClr val="FFFFFF"/>
+                </a:solidFill>
+              </a:rPr>
+              <a:t>MERN Stack</a:t>
+            </a:r>
+          </a:p>
+        </p:txBody>
+      </p:sp>
+      <p:graphicFrame>
+        <p:nvGraphicFramePr>
+          <p:cNvPr id="5" name="Content Placeholder 2">
+            <a:extLst>
+              <a:ext uri="{FF2B5EF4-FFF2-40B4-BE49-F238E27FC236}">
+                <a16:creationId xmlns:a16="http://schemas.microsoft.com/office/drawing/2014/main" id="{10FF6BFA-AFE1-46BC-9BBE-70AE3AF44341}"/>
+              </a:ext>
+            </a:extLst>
+          </p:cNvPr>
+          <p:cNvGraphicFramePr>
+            <a:graphicFrameLocks noGrp="1"/>
+          </p:cNvGraphicFramePr>
+          <p:nvPr>
+            <p:ph idx="1"/>
+            <p:extLst>
+              <p:ext uri="{D42A27DB-BD31-4B8C-83A1-F6EECF244321}">
+                <p14:modId xmlns:p14="http://schemas.microsoft.com/office/powerpoint/2010/main" val="1404573159"/>
+              </p:ext>
+            </p:extLst>
+          </p:nvPr>
+        </p:nvGraphicFramePr>
+        <p:xfrm>
+          <a:off x="5194300" y="470924"/>
+          <a:ext cx="6513604" cy="5885426"/>
+        </p:xfrm>
+        <a:graphic>
+          <a:graphicData uri="http://schemas.openxmlformats.org/drawingml/2006/diagram">
+            <dgm:relIds xmlns:dgm="http://schemas.openxmlformats.org/drawingml/2006/diagram" xmlns:r="http://schemas.openxmlformats.org/officeDocument/2006/relationships" r:dm="rId2" r:lo="rId3" r:qs="rId4" r:cs="rId5"/>
+          </a:graphicData>
+        </a:graphic>
+      </p:graphicFrame>
+    </p:spTree>
+    <p:extLst>
+      <p:ext uri="{BB962C8B-B14F-4D97-AF65-F5344CB8AC3E}">
+        <p14:creationId xmlns:p14="http://schemas.microsoft.com/office/powerpoint/2010/main" val="2709793541"/>
+      </p:ext>
+    </p:extLst>
+  </p:cSld>
+  <p:clrMapOvr>
+    <a:masterClrMapping/>
+  </p:clrMapOvr>
+</p:sld>
+</file>
+
+<file path=ppt/slides/slide5.xml><?xml version="1.0" encoding="utf-8"?>
 <p:sld xmlns:a="http://schemas.openxmlformats.org/drawingml/2006/main" xmlns:r="http://schemas.openxmlformats.org/officeDocument/2006/relationships" xmlns:p="http://schemas.openxmlformats.org/presentationml/2006/main">
   <p:cSld>
     <p:spTree>
@@ -4173,7 +7336,7 @@
           <p:cNvPr id="2" name="Title 1">
             <a:extLst>
               <a:ext uri="{FF2B5EF4-FFF2-40B4-BE49-F238E27FC236}">
-                <a16:creationId xmlns:a16="http://schemas.microsoft.com/office/drawing/2014/main" id="{F9ECC00F-4094-4E5C-AB57-D99BB840417B}"/>
+                <a16:creationId xmlns:a16="http://schemas.microsoft.com/office/drawing/2014/main" id="{5B516C23-A653-48E9-B01B-BD8B7BC7063E}"/>
               </a:ext>
             </a:extLst>
           </p:cNvPr>
@@ -4184,47 +7347,64 @@
             <p:ph type="title"/>
           </p:nvPr>
         </p:nvSpPr>
-        <p:spPr/>
+        <p:spPr>
+          <a:xfrm>
+            <a:off x="3469834" y="0"/>
+            <a:ext cx="5252332" cy="1325563"/>
+          </a:xfrm>
+        </p:spPr>
         <p:txBody>
-          <a:bodyPr/>
+          <a:bodyPr>
+            <a:normAutofit/>
+          </a:bodyPr>
           <a:lstStyle/>
           <a:p>
             <a:r>
-              <a:rPr lang="en-US" dirty="0"/>
-              <a:t>Gantt chart</a:t>
+              <a:rPr lang="en-US" sz="5400" b="1" dirty="0"/>
+              <a:t>Entity Relationship</a:t>
             </a:r>
           </a:p>
         </p:txBody>
       </p:sp>
-      <p:sp>
-        <p:nvSpPr>
-          <p:cNvPr id="3" name="Content Placeholder 2">
-            <a:extLst>
-              <a:ext uri="{FF2B5EF4-FFF2-40B4-BE49-F238E27FC236}">
-                <a16:creationId xmlns:a16="http://schemas.microsoft.com/office/drawing/2014/main" id="{336BB75E-9F7D-4408-B58F-A10F1F7CC16F}"/>
-              </a:ext>
-            </a:extLst>
-          </p:cNvPr>
-          <p:cNvSpPr>
-            <a:spLocks noGrp="1"/>
-          </p:cNvSpPr>
+      <p:pic>
+        <p:nvPicPr>
+          <p:cNvPr id="5" name="Content Placeholder 4">
+            <a:extLst>
+              <a:ext uri="{FF2B5EF4-FFF2-40B4-BE49-F238E27FC236}">
+                <a16:creationId xmlns:a16="http://schemas.microsoft.com/office/drawing/2014/main" id="{2EC14363-D3C9-4490-A90C-433A628609C8}"/>
+              </a:ext>
+            </a:extLst>
+          </p:cNvPr>
+          <p:cNvPicPr>
+            <a:picLocks noGrp="1" noChangeAspect="1"/>
+          </p:cNvPicPr>
           <p:nvPr>
             <p:ph idx="1"/>
           </p:nvPr>
-        </p:nvSpPr>
-        <p:spPr/>
-        <p:txBody>
-          <a:bodyPr/>
-          <a:lstStyle/>
-          <a:p>
-            <a:endParaRPr lang="en-US"/>
-          </a:p>
-        </p:txBody>
-      </p:sp>
+        </p:nvPicPr>
+        <p:blipFill>
+          <a:blip r:embed="rId2">
+            <a:extLst>
+              <a:ext uri="{28A0092B-C50C-407E-A947-70E740481C1C}">
+                <a14:useLocalDpi xmlns:a14="http://schemas.microsoft.com/office/drawing/2010/main" val="0"/>
+              </a:ext>
+            </a:extLst>
+          </a:blip>
+          <a:stretch>
+            <a:fillRect/>
+          </a:stretch>
+        </p:blipFill>
+        <p:spPr>
+          <a:xfrm>
+            <a:off x="999897" y="1325563"/>
+            <a:ext cx="10192206" cy="4997603"/>
+          </a:xfrm>
+        </p:spPr>
+      </p:pic>
     </p:spTree>
     <p:extLst>
       <p:ext uri="{BB962C8B-B14F-4D97-AF65-F5344CB8AC3E}">
-        <p14:creationId xmlns:p14="http://schemas.microsoft.com/office/powerpoint/2010/main" val="342082328"/>
+        <p14:creationId xmlns:p14="http://schemas.microsoft.com/office/powerpoint/2010/main" val="3781560907"/>
       </p:ext>
     </p:extLst>
   </p:cSld>
@@ -4234,7 +7414,7 @@
 </p:sld>
 </file>
 
-<file path=ppt/slides/slide5.xml><?xml version="1.0" encoding="utf-8"?>
+<file path=ppt/slides/slide6.xml><?xml version="1.0" encoding="utf-8"?>
 <p:sld xmlns:a="http://schemas.openxmlformats.org/drawingml/2006/main" xmlns:r="http://schemas.openxmlformats.org/officeDocument/2006/relationships" xmlns:p="http://schemas.openxmlformats.org/presentationml/2006/main">
   <p:cSld>
     <p:bg>
@@ -4342,7 +7522,107 @@
 </p:sld>
 </file>
 
-<file path=ppt/slides/slide6.xml><?xml version="1.0" encoding="utf-8"?>
+<file path=ppt/slides/slide7.xml><?xml version="1.0" encoding="utf-8"?>
+<p:sld xmlns:a="http://schemas.openxmlformats.org/drawingml/2006/main" xmlns:r="http://schemas.openxmlformats.org/officeDocument/2006/relationships" xmlns:p="http://schemas.openxmlformats.org/presentationml/2006/main">
+  <p:cSld>
+    <p:spTree>
+      <p:nvGrpSpPr>
+        <p:cNvPr id="1" name=""/>
+        <p:cNvGrpSpPr/>
+        <p:nvPr/>
+      </p:nvGrpSpPr>
+      <p:grpSpPr>
+        <a:xfrm>
+          <a:off x="0" y="0"/>
+          <a:ext cx="0" cy="0"/>
+          <a:chOff x="0" y="0"/>
+          <a:chExt cx="0" cy="0"/>
+        </a:xfrm>
+      </p:grpSpPr>
+      <p:pic>
+        <p:nvPicPr>
+          <p:cNvPr id="16" name="Content Placeholder 15">
+            <a:extLst>
+              <a:ext uri="{FF2B5EF4-FFF2-40B4-BE49-F238E27FC236}">
+                <a16:creationId xmlns:a16="http://schemas.microsoft.com/office/drawing/2014/main" id="{992F156E-A8A6-4D56-B108-E80074F76E8E}"/>
+              </a:ext>
+            </a:extLst>
+          </p:cNvPr>
+          <p:cNvPicPr>
+            <a:picLocks noGrp="1" noChangeAspect="1"/>
+          </p:cNvPicPr>
+          <p:nvPr>
+            <p:ph idx="1"/>
+          </p:nvPr>
+        </p:nvPicPr>
+        <p:blipFill>
+          <a:blip r:embed="rId2">
+            <a:extLst>
+              <a:ext uri="{28A0092B-C50C-407E-A947-70E740481C1C}">
+                <a14:useLocalDpi xmlns:a14="http://schemas.microsoft.com/office/drawing/2010/main" val="0"/>
+              </a:ext>
+            </a:extLst>
+          </a:blip>
+          <a:stretch>
+            <a:fillRect/>
+          </a:stretch>
+        </p:blipFill>
+        <p:spPr>
+          <a:xfrm>
+            <a:off x="0" y="32748"/>
+            <a:ext cx="12192000" cy="6792504"/>
+          </a:xfrm>
+        </p:spPr>
+      </p:pic>
+      <p:sp>
+        <p:nvSpPr>
+          <p:cNvPr id="11" name="TextBox 10">
+            <a:extLst>
+              <a:ext uri="{FF2B5EF4-FFF2-40B4-BE49-F238E27FC236}">
+                <a16:creationId xmlns:a16="http://schemas.microsoft.com/office/drawing/2014/main" id="{C7300679-515B-4446-B7FB-664E99F53320}"/>
+              </a:ext>
+            </a:extLst>
+          </p:cNvPr>
+          <p:cNvSpPr txBox="1"/>
+          <p:nvPr/>
+        </p:nvSpPr>
+        <p:spPr>
+          <a:xfrm>
+            <a:off x="542260" y="32748"/>
+            <a:ext cx="2020187" cy="923330"/>
+          </a:xfrm>
+          <a:prstGeom prst="rect">
+            <a:avLst/>
+          </a:prstGeom>
+          <a:noFill/>
+        </p:spPr>
+        <p:txBody>
+          <a:bodyPr wrap="square" rtlCol="0">
+            <a:spAutoFit/>
+          </a:bodyPr>
+          <a:lstStyle/>
+          <a:p>
+            <a:r>
+              <a:rPr lang="en-US" sz="5400" b="1" dirty="0"/>
+              <a:t>Gantt</a:t>
+            </a:r>
+          </a:p>
+        </p:txBody>
+      </p:sp>
+    </p:spTree>
+    <p:extLst>
+      <p:ext uri="{BB962C8B-B14F-4D97-AF65-F5344CB8AC3E}">
+        <p14:creationId xmlns:p14="http://schemas.microsoft.com/office/powerpoint/2010/main" val="342082328"/>
+      </p:ext>
+    </p:extLst>
+  </p:cSld>
+  <p:clrMapOvr>
+    <a:masterClrMapping/>
+  </p:clrMapOvr>
+</p:sld>
+</file>
+
+<file path=ppt/slides/slide8.xml><?xml version="1.0" encoding="utf-8"?>
 <p:sld xmlns:a="http://schemas.openxmlformats.org/drawingml/2006/main" xmlns:r="http://schemas.openxmlformats.org/officeDocument/2006/relationships" xmlns:p="http://schemas.openxmlformats.org/presentationml/2006/main">
   <p:cSld>
     <p:spTree>
@@ -4364,106 +7644,6 @@
           <p:cNvPr id="2" name="Title 1">
             <a:extLst>
               <a:ext uri="{FF2B5EF4-FFF2-40B4-BE49-F238E27FC236}">
-                <a16:creationId xmlns:a16="http://schemas.microsoft.com/office/drawing/2014/main" id="{5B516C23-A653-48E9-B01B-BD8B7BC7063E}"/>
-              </a:ext>
-            </a:extLst>
-          </p:cNvPr>
-          <p:cNvSpPr>
-            <a:spLocks noGrp="1"/>
-          </p:cNvSpPr>
-          <p:nvPr>
-            <p:ph type="title"/>
-          </p:nvPr>
-        </p:nvSpPr>
-        <p:spPr>
-          <a:xfrm>
-            <a:off x="3469834" y="0"/>
-            <a:ext cx="5252332" cy="1325563"/>
-          </a:xfrm>
-        </p:spPr>
-        <p:txBody>
-          <a:bodyPr>
-            <a:normAutofit/>
-          </a:bodyPr>
-          <a:lstStyle/>
-          <a:p>
-            <a:r>
-              <a:rPr lang="en-US" sz="5400" b="1" dirty="0"/>
-              <a:t>Entity Relationship</a:t>
-            </a:r>
-          </a:p>
-        </p:txBody>
-      </p:sp>
-      <p:pic>
-        <p:nvPicPr>
-          <p:cNvPr id="5" name="Content Placeholder 4">
-            <a:extLst>
-              <a:ext uri="{FF2B5EF4-FFF2-40B4-BE49-F238E27FC236}">
-                <a16:creationId xmlns:a16="http://schemas.microsoft.com/office/drawing/2014/main" id="{2EC14363-D3C9-4490-A90C-433A628609C8}"/>
-              </a:ext>
-            </a:extLst>
-          </p:cNvPr>
-          <p:cNvPicPr>
-            <a:picLocks noGrp="1" noChangeAspect="1"/>
-          </p:cNvPicPr>
-          <p:nvPr>
-            <p:ph idx="1"/>
-          </p:nvPr>
-        </p:nvPicPr>
-        <p:blipFill>
-          <a:blip r:embed="rId2">
-            <a:extLst>
-              <a:ext uri="{28A0092B-C50C-407E-A947-70E740481C1C}">
-                <a14:useLocalDpi xmlns:a14="http://schemas.microsoft.com/office/drawing/2010/main" val="0"/>
-              </a:ext>
-            </a:extLst>
-          </a:blip>
-          <a:stretch>
-            <a:fillRect/>
-          </a:stretch>
-        </p:blipFill>
-        <p:spPr>
-          <a:xfrm>
-            <a:off x="999897" y="1325563"/>
-            <a:ext cx="10192206" cy="4997603"/>
-          </a:xfrm>
-        </p:spPr>
-      </p:pic>
-    </p:spTree>
-    <p:extLst>
-      <p:ext uri="{BB962C8B-B14F-4D97-AF65-F5344CB8AC3E}">
-        <p14:creationId xmlns:p14="http://schemas.microsoft.com/office/powerpoint/2010/main" val="3781560907"/>
-      </p:ext>
-    </p:extLst>
-  </p:cSld>
-  <p:clrMapOvr>
-    <a:masterClrMapping/>
-  </p:clrMapOvr>
-</p:sld>
-</file>
-
-<file path=ppt/slides/slide7.xml><?xml version="1.0" encoding="utf-8"?>
-<p:sld xmlns:a="http://schemas.openxmlformats.org/drawingml/2006/main" xmlns:r="http://schemas.openxmlformats.org/officeDocument/2006/relationships" xmlns:p="http://schemas.openxmlformats.org/presentationml/2006/main">
-  <p:cSld>
-    <p:spTree>
-      <p:nvGrpSpPr>
-        <p:cNvPr id="1" name=""/>
-        <p:cNvGrpSpPr/>
-        <p:nvPr/>
-      </p:nvGrpSpPr>
-      <p:grpSpPr>
-        <a:xfrm>
-          <a:off x="0" y="0"/>
-          <a:ext cx="0" cy="0"/>
-          <a:chOff x="0" y="0"/>
-          <a:chExt cx="0" cy="0"/>
-        </a:xfrm>
-      </p:grpSpPr>
-      <p:sp>
-        <p:nvSpPr>
-          <p:cNvPr id="2" name="Title 1">
-            <a:extLst>
-              <a:ext uri="{FF2B5EF4-FFF2-40B4-BE49-F238E27FC236}">
                 <a16:creationId xmlns:a16="http://schemas.microsoft.com/office/drawing/2014/main" id="{E1CF250F-F321-4BBB-9A60-C4E151334925}"/>
               </a:ext>
             </a:extLst>
@@ -4510,7 +7690,22 @@
           <a:bodyPr/>
           <a:lstStyle/>
           <a:p>
-            <a:endParaRPr lang="en-US"/>
+            <a:r>
+              <a:rPr lang="en-US" dirty="0"/>
+              <a:t>Weekly meet-ups</a:t>
+            </a:r>
+          </a:p>
+          <a:p>
+            <a:r>
+              <a:rPr lang="en-US" dirty="0"/>
+              <a:t>Prior experience with MERN</a:t>
+            </a:r>
+          </a:p>
+          <a:p>
+            <a:r>
+              <a:rPr lang="en-US" dirty="0"/>
+              <a:t>High knowledge absorption</a:t>
+            </a:r>
           </a:p>
         </p:txBody>
       </p:sp>
@@ -4550,14 +7745,11 @@
           <a:p>
             <a:r>
               <a:rPr lang="en-US" dirty="0"/>
-              <a:t>Late presentation date</a:t>
-            </a:r>
-          </a:p>
-          <a:p>
-            <a:r>
-              <a:rPr lang="en-US" dirty="0"/>
               <a:t>React</a:t>
             </a:r>
+          </a:p>
+          <a:p>
+            <a:endParaRPr lang="en-US" dirty="0"/>
           </a:p>
           <a:p>
             <a:endParaRPr lang="en-US" dirty="0"/>
@@ -4567,6 +7759,78 @@
           </a:p>
         </p:txBody>
       </p:sp>
+      <p:pic>
+        <p:nvPicPr>
+          <p:cNvPr id="6" name="Picture 5">
+            <a:extLst>
+              <a:ext uri="{FF2B5EF4-FFF2-40B4-BE49-F238E27FC236}">
+                <a16:creationId xmlns:a16="http://schemas.microsoft.com/office/drawing/2014/main" id="{567D9484-26DF-4E7E-AF5F-45D4E4998CC5}"/>
+              </a:ext>
+            </a:extLst>
+          </p:cNvPr>
+          <p:cNvPicPr>
+            <a:picLocks noChangeAspect="1"/>
+          </p:cNvPicPr>
+          <p:nvPr/>
+        </p:nvPicPr>
+        <p:blipFill>
+          <a:blip r:embed="rId2">
+            <a:extLst>
+              <a:ext uri="{28A0092B-C50C-407E-A947-70E740481C1C}">
+                <a14:useLocalDpi xmlns:a14="http://schemas.microsoft.com/office/drawing/2010/main" val="0"/>
+              </a:ext>
+            </a:extLst>
+          </a:blip>
+          <a:stretch>
+            <a:fillRect/>
+          </a:stretch>
+        </p:blipFill>
+        <p:spPr>
+          <a:xfrm>
+            <a:off x="1832196" y="4001294"/>
+            <a:ext cx="1993243" cy="2638942"/>
+          </a:xfrm>
+          <a:prstGeom prst="rect">
+            <a:avLst/>
+          </a:prstGeom>
+        </p:spPr>
+      </p:pic>
+      <p:pic>
+        <p:nvPicPr>
+          <p:cNvPr id="8" name="Picture 7">
+            <a:extLst>
+              <a:ext uri="{FF2B5EF4-FFF2-40B4-BE49-F238E27FC236}">
+                <a16:creationId xmlns:a16="http://schemas.microsoft.com/office/drawing/2014/main" id="{8203CCEA-A13B-413E-9EA9-F0B1231B4D63}"/>
+              </a:ext>
+            </a:extLst>
+          </p:cNvPr>
+          <p:cNvPicPr>
+            <a:picLocks noChangeAspect="1"/>
+          </p:cNvPicPr>
+          <p:nvPr/>
+        </p:nvPicPr>
+        <p:blipFill>
+          <a:blip r:embed="rId3">
+            <a:extLst>
+              <a:ext uri="{28A0092B-C50C-407E-A947-70E740481C1C}">
+                <a14:useLocalDpi xmlns:a14="http://schemas.microsoft.com/office/drawing/2010/main" val="0"/>
+              </a:ext>
+            </a:extLst>
+          </a:blip>
+          <a:stretch>
+            <a:fillRect/>
+          </a:stretch>
+        </p:blipFill>
+        <p:spPr>
+          <a:xfrm>
+            <a:off x="8020280" y="4550096"/>
+            <a:ext cx="1914286" cy="2180952"/>
+          </a:xfrm>
+          <a:prstGeom prst="rect">
+            <a:avLst/>
+          </a:prstGeom>
+        </p:spPr>
+      </p:pic>
     </p:spTree>
     <p:extLst>
       <p:ext uri="{BB962C8B-B14F-4D97-AF65-F5344CB8AC3E}">

</xml_diff>